<commit_message>
ST 1/9/2025 updated yaml file to include specification.
</commit_message>
<xml_diff>
--- a/input/imagesourcefiles/BSeR Flow Diagrams - V7.pptx
+++ b/input/imagesourcefiles/BSeR Flow Diagrams - V7.pptx
@@ -5,13 +5,14 @@
     <p:sldMasterId id="2147483648" r:id="rId3"/>
   </p:sldMasterIdLst>
   <p:notesMasterIdLst>
-    <p:notesMasterId r:id="rId8"/>
+    <p:notesMasterId r:id="rId9"/>
   </p:notesMasterIdLst>
   <p:sldIdLst>
     <p:sldId id="649" r:id="rId4"/>
     <p:sldId id="651" r:id="rId5"/>
     <p:sldId id="654" r:id="rId6"/>
     <p:sldId id="652" r:id="rId7"/>
+    <p:sldId id="655" r:id="rId8"/>
   </p:sldIdLst>
   <p:sldSz cx="10383838" cy="7254875"/>
   <p:notesSz cx="6858000" cy="9144000"/>
@@ -137,6 +138,3115 @@
 </p1510:revInfo>
 </file>
 
+<file path=ppt/diagrams/colors1.xml><?xml version="1.0" encoding="utf-8"?>
+<dgm:colorsDef xmlns:dgm="http://schemas.openxmlformats.org/drawingml/2006/diagram" xmlns:a="http://schemas.openxmlformats.org/drawingml/2006/main" uniqueId="urn:microsoft.com/office/officeart/2005/8/colors/colorful3">
+  <dgm:title val=""/>
+  <dgm:desc val=""/>
+  <dgm:catLst>
+    <dgm:cat type="colorful" pri="10300"/>
+  </dgm:catLst>
+  <dgm:styleLbl name="node0">
+    <dgm:fillClrLst meth="repeat">
+      <a:schemeClr val="accent2"/>
+    </dgm:fillClrLst>
+    <dgm:linClrLst meth="repeat">
+      <a:schemeClr val="lt1"/>
+    </dgm:linClrLst>
+    <dgm:effectClrLst/>
+    <dgm:txLinClrLst/>
+    <dgm:txFillClrLst/>
+    <dgm:txEffectClrLst/>
+  </dgm:styleLbl>
+  <dgm:styleLbl name="node1">
+    <dgm:fillClrLst>
+      <a:schemeClr val="accent3"/>
+      <a:schemeClr val="accent4"/>
+    </dgm:fillClrLst>
+    <dgm:linClrLst meth="repeat">
+      <a:schemeClr val="lt1"/>
+    </dgm:linClrLst>
+    <dgm:effectClrLst/>
+    <dgm:txLinClrLst/>
+    <dgm:txFillClrLst/>
+    <dgm:txEffectClrLst/>
+  </dgm:styleLbl>
+  <dgm:styleLbl name="alignNode1">
+    <dgm:fillClrLst>
+      <a:schemeClr val="accent3"/>
+      <a:schemeClr val="accent4"/>
+    </dgm:fillClrLst>
+    <dgm:linClrLst>
+      <a:schemeClr val="accent3"/>
+      <a:schemeClr val="accent4"/>
+    </dgm:linClrLst>
+    <dgm:effectClrLst/>
+    <dgm:txLinClrLst/>
+    <dgm:txFillClrLst/>
+    <dgm:txEffectClrLst/>
+  </dgm:styleLbl>
+  <dgm:styleLbl name="lnNode1">
+    <dgm:fillClrLst>
+      <a:schemeClr val="accent3"/>
+      <a:schemeClr val="accent4"/>
+    </dgm:fillClrLst>
+    <dgm:linClrLst meth="repeat">
+      <a:schemeClr val="lt1"/>
+    </dgm:linClrLst>
+    <dgm:effectClrLst/>
+    <dgm:txLinClrLst/>
+    <dgm:txFillClrLst/>
+    <dgm:txEffectClrLst/>
+  </dgm:styleLbl>
+  <dgm:styleLbl name="vennNode1">
+    <dgm:fillClrLst>
+      <a:schemeClr val="accent3">
+        <a:alpha val="50000"/>
+      </a:schemeClr>
+      <a:schemeClr val="accent4">
+        <a:alpha val="50000"/>
+      </a:schemeClr>
+    </dgm:fillClrLst>
+    <dgm:linClrLst meth="repeat">
+      <a:schemeClr val="lt1"/>
+    </dgm:linClrLst>
+    <dgm:effectClrLst/>
+    <dgm:txLinClrLst/>
+    <dgm:txFillClrLst/>
+    <dgm:txEffectClrLst/>
+  </dgm:styleLbl>
+  <dgm:styleLbl name="node2">
+    <dgm:fillClrLst>
+      <a:schemeClr val="accent4"/>
+    </dgm:fillClrLst>
+    <dgm:linClrLst meth="repeat">
+      <a:schemeClr val="lt1"/>
+    </dgm:linClrLst>
+    <dgm:effectClrLst/>
+    <dgm:txLinClrLst/>
+    <dgm:txFillClrLst/>
+    <dgm:txEffectClrLst/>
+  </dgm:styleLbl>
+  <dgm:styleLbl name="node3">
+    <dgm:fillClrLst>
+      <a:schemeClr val="accent5"/>
+    </dgm:fillClrLst>
+    <dgm:linClrLst meth="repeat">
+      <a:schemeClr val="lt1"/>
+    </dgm:linClrLst>
+    <dgm:effectClrLst/>
+    <dgm:txLinClrLst/>
+    <dgm:txFillClrLst/>
+    <dgm:txEffectClrLst/>
+  </dgm:styleLbl>
+  <dgm:styleLbl name="node4">
+    <dgm:fillClrLst>
+      <a:schemeClr val="accent6"/>
+    </dgm:fillClrLst>
+    <dgm:linClrLst meth="repeat">
+      <a:schemeClr val="lt1"/>
+    </dgm:linClrLst>
+    <dgm:effectClrLst/>
+    <dgm:txLinClrLst/>
+    <dgm:txFillClrLst/>
+    <dgm:txEffectClrLst/>
+  </dgm:styleLbl>
+  <dgm:styleLbl name="fgImgPlace1">
+    <dgm:fillClrLst>
+      <a:schemeClr val="accent3">
+        <a:tint val="50000"/>
+      </a:schemeClr>
+      <a:schemeClr val="accent4">
+        <a:tint val="50000"/>
+      </a:schemeClr>
+    </dgm:fillClrLst>
+    <dgm:linClrLst meth="repeat">
+      <a:schemeClr val="lt1"/>
+    </dgm:linClrLst>
+    <dgm:effectClrLst/>
+    <dgm:txLinClrLst/>
+    <dgm:txFillClrLst meth="repeat">
+      <a:schemeClr val="lt1"/>
+    </dgm:txFillClrLst>
+    <dgm:txEffectClrLst/>
+  </dgm:styleLbl>
+  <dgm:styleLbl name="alignImgPlace1">
+    <dgm:fillClrLst>
+      <a:schemeClr val="accent3">
+        <a:tint val="50000"/>
+      </a:schemeClr>
+      <a:schemeClr val="accent4">
+        <a:tint val="20000"/>
+      </a:schemeClr>
+    </dgm:fillClrLst>
+    <dgm:linClrLst meth="repeat">
+      <a:schemeClr val="lt1"/>
+    </dgm:linClrLst>
+    <dgm:effectClrLst/>
+    <dgm:txLinClrLst/>
+    <dgm:txFillClrLst meth="repeat">
+      <a:schemeClr val="lt1"/>
+    </dgm:txFillClrLst>
+    <dgm:txEffectClrLst/>
+  </dgm:styleLbl>
+  <dgm:styleLbl name="bgImgPlace1">
+    <dgm:fillClrLst>
+      <a:schemeClr val="accent3">
+        <a:tint val="50000"/>
+      </a:schemeClr>
+      <a:schemeClr val="accent4">
+        <a:tint val="20000"/>
+      </a:schemeClr>
+    </dgm:fillClrLst>
+    <dgm:linClrLst meth="repeat">
+      <a:schemeClr val="lt1"/>
+    </dgm:linClrLst>
+    <dgm:effectClrLst/>
+    <dgm:txLinClrLst/>
+    <dgm:txFillClrLst meth="repeat">
+      <a:schemeClr val="lt1"/>
+    </dgm:txFillClrLst>
+    <dgm:txEffectClrLst/>
+  </dgm:styleLbl>
+  <dgm:styleLbl name="sibTrans2D1">
+    <dgm:fillClrLst>
+      <a:schemeClr val="accent3"/>
+      <a:schemeClr val="accent4"/>
+    </dgm:fillClrLst>
+    <dgm:linClrLst meth="repeat">
+      <a:schemeClr val="lt1"/>
+    </dgm:linClrLst>
+    <dgm:effectClrLst/>
+    <dgm:txLinClrLst/>
+    <dgm:txFillClrLst/>
+    <dgm:txEffectClrLst/>
+  </dgm:styleLbl>
+  <dgm:styleLbl name="fgSibTrans2D1">
+    <dgm:fillClrLst>
+      <a:schemeClr val="accent3"/>
+      <a:schemeClr val="accent4"/>
+    </dgm:fillClrLst>
+    <dgm:linClrLst meth="repeat">
+      <a:schemeClr val="lt1"/>
+    </dgm:linClrLst>
+    <dgm:effectClrLst/>
+    <dgm:txLinClrLst/>
+    <dgm:txFillClrLst meth="repeat">
+      <a:schemeClr val="lt1"/>
+    </dgm:txFillClrLst>
+    <dgm:txEffectClrLst/>
+  </dgm:styleLbl>
+  <dgm:styleLbl name="bgSibTrans2D1">
+    <dgm:fillClrLst>
+      <a:schemeClr val="accent3"/>
+      <a:schemeClr val="accent4"/>
+    </dgm:fillClrLst>
+    <dgm:linClrLst meth="repeat">
+      <a:schemeClr val="lt1"/>
+    </dgm:linClrLst>
+    <dgm:effectClrLst/>
+    <dgm:txLinClrLst/>
+    <dgm:txFillClrLst meth="repeat">
+      <a:schemeClr val="lt1"/>
+    </dgm:txFillClrLst>
+    <dgm:txEffectClrLst/>
+  </dgm:styleLbl>
+  <dgm:styleLbl name="sibTrans1D1">
+    <dgm:fillClrLst/>
+    <dgm:linClrLst>
+      <a:schemeClr val="accent3"/>
+      <a:schemeClr val="accent4"/>
+    </dgm:linClrLst>
+    <dgm:effectClrLst/>
+    <dgm:txLinClrLst/>
+    <dgm:txFillClrLst meth="repeat">
+      <a:schemeClr val="tx1"/>
+    </dgm:txFillClrLst>
+    <dgm:txEffectClrLst/>
+  </dgm:styleLbl>
+  <dgm:styleLbl name="callout">
+    <dgm:fillClrLst meth="repeat">
+      <a:schemeClr val="accent3"/>
+    </dgm:fillClrLst>
+    <dgm:linClrLst meth="repeat">
+      <a:schemeClr val="accent3">
+        <a:tint val="50000"/>
+      </a:schemeClr>
+    </dgm:linClrLst>
+    <dgm:effectClrLst/>
+    <dgm:txLinClrLst/>
+    <dgm:txFillClrLst meth="repeat">
+      <a:schemeClr val="tx1"/>
+    </dgm:txFillClrLst>
+    <dgm:txEffectClrLst/>
+  </dgm:styleLbl>
+  <dgm:styleLbl name="asst0">
+    <dgm:fillClrLst meth="repeat">
+      <a:schemeClr val="accent3"/>
+    </dgm:fillClrLst>
+    <dgm:linClrLst meth="repeat">
+      <a:schemeClr val="lt1">
+        <a:shade val="80000"/>
+      </a:schemeClr>
+    </dgm:linClrLst>
+    <dgm:effectClrLst/>
+    <dgm:txLinClrLst/>
+    <dgm:txFillClrLst/>
+    <dgm:txEffectClrLst/>
+  </dgm:styleLbl>
+  <dgm:styleLbl name="asst1">
+    <dgm:fillClrLst meth="repeat">
+      <a:schemeClr val="accent4"/>
+    </dgm:fillClrLst>
+    <dgm:linClrLst meth="repeat">
+      <a:schemeClr val="lt1">
+        <a:shade val="80000"/>
+      </a:schemeClr>
+    </dgm:linClrLst>
+    <dgm:effectClrLst/>
+    <dgm:txLinClrLst/>
+    <dgm:txFillClrLst/>
+    <dgm:txEffectClrLst/>
+  </dgm:styleLbl>
+  <dgm:styleLbl name="asst2">
+    <dgm:fillClrLst>
+      <a:schemeClr val="accent5"/>
+    </dgm:fillClrLst>
+    <dgm:linClrLst meth="repeat">
+      <a:schemeClr val="lt1"/>
+    </dgm:linClrLst>
+    <dgm:effectClrLst/>
+    <dgm:txLinClrLst/>
+    <dgm:txFillClrLst/>
+    <dgm:txEffectClrLst/>
+  </dgm:styleLbl>
+  <dgm:styleLbl name="asst3">
+    <dgm:fillClrLst>
+      <a:schemeClr val="accent6"/>
+    </dgm:fillClrLst>
+    <dgm:linClrLst meth="repeat">
+      <a:schemeClr val="lt1"/>
+    </dgm:linClrLst>
+    <dgm:effectClrLst/>
+    <dgm:txLinClrLst/>
+    <dgm:txFillClrLst/>
+    <dgm:txEffectClrLst/>
+  </dgm:styleLbl>
+  <dgm:styleLbl name="asst4">
+    <dgm:fillClrLst>
+      <a:schemeClr val="accent1"/>
+    </dgm:fillClrLst>
+    <dgm:linClrLst meth="repeat">
+      <a:schemeClr val="lt1"/>
+    </dgm:linClrLst>
+    <dgm:effectClrLst/>
+    <dgm:txLinClrLst/>
+    <dgm:txFillClrLst/>
+    <dgm:txEffectClrLst/>
+  </dgm:styleLbl>
+  <dgm:styleLbl name="parChTrans2D1">
+    <dgm:fillClrLst meth="repeat">
+      <a:schemeClr val="accent2"/>
+    </dgm:fillClrLst>
+    <dgm:linClrLst meth="repeat">
+      <a:schemeClr val="lt1"/>
+    </dgm:linClrLst>
+    <dgm:effectClrLst/>
+    <dgm:txLinClrLst/>
+    <dgm:txFillClrLst meth="repeat">
+      <a:schemeClr val="lt1"/>
+    </dgm:txFillClrLst>
+    <dgm:txEffectClrLst/>
+  </dgm:styleLbl>
+  <dgm:styleLbl name="parChTrans2D2">
+    <dgm:fillClrLst meth="repeat">
+      <a:schemeClr val="accent3"/>
+    </dgm:fillClrLst>
+    <dgm:linClrLst meth="repeat">
+      <a:schemeClr val="lt1"/>
+    </dgm:linClrLst>
+    <dgm:effectClrLst/>
+    <dgm:txLinClrLst/>
+    <dgm:txFillClrLst/>
+    <dgm:txEffectClrLst/>
+  </dgm:styleLbl>
+  <dgm:styleLbl name="parChTrans2D3">
+    <dgm:fillClrLst meth="repeat">
+      <a:schemeClr val="accent4"/>
+    </dgm:fillClrLst>
+    <dgm:linClrLst meth="repeat">
+      <a:schemeClr val="lt1"/>
+    </dgm:linClrLst>
+    <dgm:effectClrLst/>
+    <dgm:txLinClrLst/>
+    <dgm:txFillClrLst/>
+    <dgm:txEffectClrLst/>
+  </dgm:styleLbl>
+  <dgm:styleLbl name="parChTrans2D4">
+    <dgm:fillClrLst meth="repeat">
+      <a:schemeClr val="accent5"/>
+    </dgm:fillClrLst>
+    <dgm:linClrLst meth="repeat">
+      <a:schemeClr val="lt1"/>
+    </dgm:linClrLst>
+    <dgm:effectClrLst/>
+    <dgm:txLinClrLst/>
+    <dgm:txFillClrLst meth="repeat">
+      <a:schemeClr val="lt1"/>
+    </dgm:txFillClrLst>
+    <dgm:txEffectClrLst/>
+  </dgm:styleLbl>
+  <dgm:styleLbl name="parChTrans1D1">
+    <dgm:fillClrLst meth="repeat">
+      <a:schemeClr val="accent3"/>
+    </dgm:fillClrLst>
+    <dgm:linClrLst meth="repeat">
+      <a:schemeClr val="accent3"/>
+    </dgm:linClrLst>
+    <dgm:effectClrLst/>
+    <dgm:txLinClrLst/>
+    <dgm:txFillClrLst meth="repeat">
+      <a:schemeClr val="tx1"/>
+    </dgm:txFillClrLst>
+    <dgm:txEffectClrLst/>
+  </dgm:styleLbl>
+  <dgm:styleLbl name="parChTrans1D2">
+    <dgm:fillClrLst meth="repeat">
+      <a:schemeClr val="accent2">
+        <a:tint val="90000"/>
+      </a:schemeClr>
+    </dgm:fillClrLst>
+    <dgm:linClrLst meth="repeat">
+      <a:schemeClr val="accent4"/>
+    </dgm:linClrLst>
+    <dgm:effectClrLst/>
+    <dgm:txLinClrLst/>
+    <dgm:txFillClrLst meth="repeat">
+      <a:schemeClr val="tx1"/>
+    </dgm:txFillClrLst>
+    <dgm:txEffectClrLst/>
+  </dgm:styleLbl>
+  <dgm:styleLbl name="parChTrans1D3">
+    <dgm:fillClrLst meth="repeat">
+      <a:schemeClr val="accent2">
+        <a:tint val="70000"/>
+      </a:schemeClr>
+    </dgm:fillClrLst>
+    <dgm:linClrLst meth="repeat">
+      <a:schemeClr val="accent5"/>
+    </dgm:linClrLst>
+    <dgm:effectClrLst/>
+    <dgm:txLinClrLst/>
+    <dgm:txFillClrLst meth="repeat">
+      <a:schemeClr val="tx1"/>
+    </dgm:txFillClrLst>
+    <dgm:txEffectClrLst/>
+  </dgm:styleLbl>
+  <dgm:styleLbl name="parChTrans1D4">
+    <dgm:fillClrLst meth="repeat">
+      <a:schemeClr val="accent6">
+        <a:tint val="50000"/>
+      </a:schemeClr>
+    </dgm:fillClrLst>
+    <dgm:linClrLst meth="repeat">
+      <a:schemeClr val="accent6"/>
+    </dgm:linClrLst>
+    <dgm:effectClrLst/>
+    <dgm:txLinClrLst/>
+    <dgm:txFillClrLst meth="repeat">
+      <a:schemeClr val="tx1"/>
+    </dgm:txFillClrLst>
+    <dgm:txEffectClrLst/>
+  </dgm:styleLbl>
+  <dgm:styleLbl name="fgAcc1">
+    <dgm:fillClrLst meth="repeat">
+      <a:schemeClr val="lt1">
+        <a:alpha val="90000"/>
+      </a:schemeClr>
+    </dgm:fillClrLst>
+    <dgm:linClrLst>
+      <a:schemeClr val="accent3"/>
+      <a:schemeClr val="accent4"/>
+    </dgm:linClrLst>
+    <dgm:effectClrLst/>
+    <dgm:txLinClrLst/>
+    <dgm:txFillClrLst meth="repeat">
+      <a:schemeClr val="dk1"/>
+    </dgm:txFillClrLst>
+    <dgm:txEffectClrLst/>
+  </dgm:styleLbl>
+  <dgm:styleLbl name="conFgAcc1">
+    <dgm:fillClrLst meth="repeat">
+      <a:schemeClr val="lt1">
+        <a:alpha val="90000"/>
+      </a:schemeClr>
+    </dgm:fillClrLst>
+    <dgm:linClrLst>
+      <a:schemeClr val="accent3"/>
+      <a:schemeClr val="accent4"/>
+    </dgm:linClrLst>
+    <dgm:effectClrLst/>
+    <dgm:txLinClrLst/>
+    <dgm:txFillClrLst meth="repeat">
+      <a:schemeClr val="dk1"/>
+    </dgm:txFillClrLst>
+    <dgm:txEffectClrLst/>
+  </dgm:styleLbl>
+  <dgm:styleLbl name="alignAcc1">
+    <dgm:fillClrLst meth="repeat">
+      <a:schemeClr val="lt1">
+        <a:alpha val="90000"/>
+      </a:schemeClr>
+    </dgm:fillClrLst>
+    <dgm:linClrLst>
+      <a:schemeClr val="accent3"/>
+      <a:schemeClr val="accent4"/>
+    </dgm:linClrLst>
+    <dgm:effectClrLst/>
+    <dgm:txLinClrLst/>
+    <dgm:txFillClrLst meth="repeat">
+      <a:schemeClr val="dk1"/>
+    </dgm:txFillClrLst>
+    <dgm:txEffectClrLst/>
+  </dgm:styleLbl>
+  <dgm:styleLbl name="trAlignAcc1">
+    <dgm:fillClrLst meth="repeat">
+      <a:schemeClr val="lt1">
+        <a:alpha val="40000"/>
+      </a:schemeClr>
+    </dgm:fillClrLst>
+    <dgm:linClrLst meth="repeat">
+      <a:schemeClr val="accent2"/>
+    </dgm:linClrLst>
+    <dgm:effectClrLst/>
+    <dgm:txLinClrLst/>
+    <dgm:txFillClrLst meth="repeat">
+      <a:schemeClr val="dk1"/>
+    </dgm:txFillClrLst>
+    <dgm:txEffectClrLst/>
+  </dgm:styleLbl>
+  <dgm:styleLbl name="bgAcc1">
+    <dgm:fillClrLst meth="repeat">
+      <a:schemeClr val="lt1">
+        <a:alpha val="90000"/>
+      </a:schemeClr>
+    </dgm:fillClrLst>
+    <dgm:linClrLst>
+      <a:schemeClr val="accent3"/>
+      <a:schemeClr val="accent4"/>
+    </dgm:linClrLst>
+    <dgm:effectClrLst/>
+    <dgm:txLinClrLst/>
+    <dgm:txFillClrLst meth="repeat">
+      <a:schemeClr val="dk1"/>
+    </dgm:txFillClrLst>
+    <dgm:txEffectClrLst/>
+  </dgm:styleLbl>
+  <dgm:styleLbl name="solidFgAcc1">
+    <dgm:fillClrLst meth="repeat">
+      <a:schemeClr val="lt1"/>
+    </dgm:fillClrLst>
+    <dgm:linClrLst>
+      <a:schemeClr val="accent3"/>
+      <a:schemeClr val="accent4"/>
+    </dgm:linClrLst>
+    <dgm:effectClrLst/>
+    <dgm:txLinClrLst/>
+    <dgm:txFillClrLst meth="repeat">
+      <a:schemeClr val="dk1"/>
+    </dgm:txFillClrLst>
+    <dgm:txEffectClrLst/>
+  </dgm:styleLbl>
+  <dgm:styleLbl name="solidAlignAcc1">
+    <dgm:fillClrLst meth="repeat">
+      <a:schemeClr val="lt1"/>
+    </dgm:fillClrLst>
+    <dgm:linClrLst>
+      <a:schemeClr val="accent3"/>
+      <a:schemeClr val="accent4"/>
+    </dgm:linClrLst>
+    <dgm:effectClrLst/>
+    <dgm:txLinClrLst/>
+    <dgm:txFillClrLst meth="repeat">
+      <a:schemeClr val="dk1"/>
+    </dgm:txFillClrLst>
+    <dgm:txEffectClrLst/>
+  </dgm:styleLbl>
+  <dgm:styleLbl name="solidBgAcc1">
+    <dgm:fillClrLst meth="repeat">
+      <a:schemeClr val="lt1"/>
+    </dgm:fillClrLst>
+    <dgm:linClrLst>
+      <a:schemeClr val="accent3"/>
+      <a:schemeClr val="accent4"/>
+    </dgm:linClrLst>
+    <dgm:effectClrLst/>
+    <dgm:txLinClrLst/>
+    <dgm:txFillClrLst meth="repeat">
+      <a:schemeClr val="dk1"/>
+    </dgm:txFillClrLst>
+    <dgm:txEffectClrLst/>
+  </dgm:styleLbl>
+  <dgm:styleLbl name="fgAccFollowNode1">
+    <dgm:fillClrLst>
+      <a:schemeClr val="accent3">
+        <a:tint val="40000"/>
+        <a:alpha val="90000"/>
+      </a:schemeClr>
+      <a:schemeClr val="accent4">
+        <a:tint val="40000"/>
+        <a:alpha val="90000"/>
+      </a:schemeClr>
+    </dgm:fillClrLst>
+    <dgm:linClrLst>
+      <a:schemeClr val="accent3">
+        <a:tint val="40000"/>
+        <a:alpha val="90000"/>
+      </a:schemeClr>
+      <a:schemeClr val="accent4">
+        <a:tint val="40000"/>
+        <a:alpha val="90000"/>
+      </a:schemeClr>
+    </dgm:linClrLst>
+    <dgm:effectClrLst/>
+    <dgm:txLinClrLst/>
+    <dgm:txFillClrLst meth="repeat">
+      <a:schemeClr val="dk1"/>
+    </dgm:txFillClrLst>
+    <dgm:txEffectClrLst/>
+  </dgm:styleLbl>
+  <dgm:styleLbl name="alignAccFollowNode1">
+    <dgm:fillClrLst>
+      <a:schemeClr val="accent3">
+        <a:tint val="40000"/>
+        <a:alpha val="90000"/>
+      </a:schemeClr>
+      <a:schemeClr val="accent4">
+        <a:tint val="40000"/>
+        <a:alpha val="90000"/>
+      </a:schemeClr>
+    </dgm:fillClrLst>
+    <dgm:linClrLst>
+      <a:schemeClr val="accent3">
+        <a:tint val="40000"/>
+        <a:alpha val="90000"/>
+      </a:schemeClr>
+      <a:schemeClr val="accent4">
+        <a:tint val="40000"/>
+        <a:alpha val="90000"/>
+      </a:schemeClr>
+    </dgm:linClrLst>
+    <dgm:effectClrLst/>
+    <dgm:txLinClrLst/>
+    <dgm:txFillClrLst meth="repeat">
+      <a:schemeClr val="dk1"/>
+    </dgm:txFillClrLst>
+    <dgm:txEffectClrLst/>
+  </dgm:styleLbl>
+  <dgm:styleLbl name="bgAccFollowNode1">
+    <dgm:fillClrLst>
+      <a:schemeClr val="accent3">
+        <a:tint val="40000"/>
+        <a:alpha val="90000"/>
+      </a:schemeClr>
+      <a:schemeClr val="accent4">
+        <a:tint val="40000"/>
+        <a:alpha val="90000"/>
+      </a:schemeClr>
+    </dgm:fillClrLst>
+    <dgm:linClrLst>
+      <a:schemeClr val="accent3">
+        <a:tint val="40000"/>
+        <a:alpha val="90000"/>
+      </a:schemeClr>
+      <a:schemeClr val="accent4">
+        <a:tint val="40000"/>
+        <a:alpha val="90000"/>
+      </a:schemeClr>
+    </dgm:linClrLst>
+    <dgm:effectClrLst/>
+    <dgm:txLinClrLst/>
+    <dgm:txFillClrLst meth="repeat">
+      <a:schemeClr val="dk1"/>
+    </dgm:txFillClrLst>
+    <dgm:txEffectClrLst/>
+  </dgm:styleLbl>
+  <dgm:styleLbl name="fgAcc0">
+    <dgm:fillClrLst meth="repeat">
+      <a:schemeClr val="lt1">
+        <a:alpha val="90000"/>
+      </a:schemeClr>
+    </dgm:fillClrLst>
+    <dgm:linClrLst>
+      <a:schemeClr val="accent2"/>
+    </dgm:linClrLst>
+    <dgm:effectClrLst/>
+    <dgm:txLinClrLst/>
+    <dgm:txFillClrLst meth="repeat">
+      <a:schemeClr val="dk1"/>
+    </dgm:txFillClrLst>
+    <dgm:txEffectClrLst/>
+  </dgm:styleLbl>
+  <dgm:styleLbl name="fgAcc2">
+    <dgm:fillClrLst meth="repeat">
+      <a:schemeClr val="lt1">
+        <a:alpha val="90000"/>
+      </a:schemeClr>
+    </dgm:fillClrLst>
+    <dgm:linClrLst>
+      <a:schemeClr val="accent4"/>
+    </dgm:linClrLst>
+    <dgm:effectClrLst/>
+    <dgm:txLinClrLst/>
+    <dgm:txFillClrLst meth="repeat">
+      <a:schemeClr val="dk1"/>
+    </dgm:txFillClrLst>
+    <dgm:txEffectClrLst/>
+  </dgm:styleLbl>
+  <dgm:styleLbl name="fgAcc3">
+    <dgm:fillClrLst meth="repeat">
+      <a:schemeClr val="lt1">
+        <a:alpha val="90000"/>
+      </a:schemeClr>
+    </dgm:fillClrLst>
+    <dgm:linClrLst>
+      <a:schemeClr val="accent5"/>
+    </dgm:linClrLst>
+    <dgm:effectClrLst/>
+    <dgm:txLinClrLst/>
+    <dgm:txFillClrLst meth="repeat">
+      <a:schemeClr val="dk1"/>
+    </dgm:txFillClrLst>
+    <dgm:txEffectClrLst/>
+  </dgm:styleLbl>
+  <dgm:styleLbl name="fgAcc4">
+    <dgm:fillClrLst meth="repeat">
+      <a:schemeClr val="lt1">
+        <a:alpha val="90000"/>
+      </a:schemeClr>
+    </dgm:fillClrLst>
+    <dgm:linClrLst>
+      <a:schemeClr val="accent6"/>
+    </dgm:linClrLst>
+    <dgm:effectClrLst/>
+    <dgm:txLinClrLst/>
+    <dgm:txFillClrLst meth="repeat">
+      <a:schemeClr val="dk1"/>
+    </dgm:txFillClrLst>
+    <dgm:txEffectClrLst/>
+  </dgm:styleLbl>
+  <dgm:styleLbl name="bgShp">
+    <dgm:fillClrLst meth="repeat">
+      <a:schemeClr val="accent3">
+        <a:tint val="40000"/>
+      </a:schemeClr>
+    </dgm:fillClrLst>
+    <dgm:linClrLst meth="repeat">
+      <a:schemeClr val="dk1"/>
+    </dgm:linClrLst>
+    <dgm:effectClrLst/>
+    <dgm:txLinClrLst/>
+    <dgm:txFillClrLst meth="repeat">
+      <a:schemeClr val="dk1"/>
+    </dgm:txFillClrLst>
+    <dgm:txEffectClrLst/>
+  </dgm:styleLbl>
+  <dgm:styleLbl name="dkBgShp">
+    <dgm:fillClrLst meth="repeat">
+      <a:schemeClr val="accent3">
+        <a:shade val="90000"/>
+      </a:schemeClr>
+    </dgm:fillClrLst>
+    <dgm:linClrLst meth="repeat">
+      <a:schemeClr val="dk1"/>
+    </dgm:linClrLst>
+    <dgm:effectClrLst/>
+    <dgm:txLinClrLst/>
+    <dgm:txFillClrLst meth="repeat">
+      <a:schemeClr val="lt1"/>
+    </dgm:txFillClrLst>
+    <dgm:txEffectClrLst/>
+  </dgm:styleLbl>
+  <dgm:styleLbl name="trBgShp">
+    <dgm:fillClrLst meth="repeat">
+      <a:schemeClr val="accent2">
+        <a:tint val="50000"/>
+        <a:alpha val="40000"/>
+      </a:schemeClr>
+    </dgm:fillClrLst>
+    <dgm:linClrLst meth="repeat">
+      <a:schemeClr val="accent3"/>
+    </dgm:linClrLst>
+    <dgm:effectClrLst/>
+    <dgm:txLinClrLst/>
+    <dgm:txFillClrLst meth="repeat">
+      <a:schemeClr val="lt1"/>
+    </dgm:txFillClrLst>
+    <dgm:txEffectClrLst/>
+  </dgm:styleLbl>
+  <dgm:styleLbl name="fgShp">
+    <dgm:fillClrLst meth="repeat">
+      <a:schemeClr val="accent3">
+        <a:tint val="40000"/>
+      </a:schemeClr>
+    </dgm:fillClrLst>
+    <dgm:linClrLst meth="repeat">
+      <a:schemeClr val="lt1"/>
+    </dgm:linClrLst>
+    <dgm:effectClrLst/>
+    <dgm:txLinClrLst/>
+    <dgm:txFillClrLst meth="repeat">
+      <a:schemeClr val="dk1"/>
+    </dgm:txFillClrLst>
+    <dgm:txEffectClrLst/>
+  </dgm:styleLbl>
+  <dgm:styleLbl name="revTx">
+    <dgm:fillClrLst meth="repeat">
+      <a:schemeClr val="lt1">
+        <a:alpha val="0"/>
+      </a:schemeClr>
+    </dgm:fillClrLst>
+    <dgm:linClrLst meth="repeat">
+      <a:schemeClr val="dk1">
+        <a:alpha val="0"/>
+      </a:schemeClr>
+    </dgm:linClrLst>
+    <dgm:effectClrLst/>
+    <dgm:txLinClrLst/>
+    <dgm:txFillClrLst meth="repeat">
+      <a:schemeClr val="tx1"/>
+    </dgm:txFillClrLst>
+    <dgm:txEffectClrLst/>
+  </dgm:styleLbl>
+</dgm:colorsDef>
+</file>
+
+<file path=ppt/diagrams/data1.xml><?xml version="1.0" encoding="utf-8"?>
+<dgm:dataModel xmlns:dgm="http://schemas.openxmlformats.org/drawingml/2006/diagram" xmlns:a="http://schemas.openxmlformats.org/drawingml/2006/main">
+  <dgm:ptLst>
+    <dgm:pt modelId="{1419DA03-AF4E-41BE-882D-0E4EB0944577}" type="doc">
+      <dgm:prSet loTypeId="urn:microsoft.com/office/officeart/2005/8/layout/radial6" loCatId="cycle" qsTypeId="urn:microsoft.com/office/officeart/2005/8/quickstyle/simple1" qsCatId="simple" csTypeId="urn:microsoft.com/office/officeart/2005/8/colors/colorful3" csCatId="colorful" phldr="1"/>
+      <dgm:spPr/>
+      <dgm:t>
+        <a:bodyPr/>
+        <a:lstStyle/>
+        <a:p>
+          <a:endParaRPr lang="en-US"/>
+        </a:p>
+      </dgm:t>
+    </dgm:pt>
+    <dgm:pt modelId="{45F92551-C2A6-46B5-86B1-7158D6242EFE}">
+      <dgm:prSet phldrT="[Text]"/>
+      <dgm:spPr/>
+      <dgm:t>
+        <a:bodyPr/>
+        <a:lstStyle/>
+        <a:p>
+          <a:r>
+            <a:rPr lang="en-US" dirty="0" err="1"/>
+            <a:t>BSeR</a:t>
+          </a:r>
+          <a:r>
+            <a:rPr lang="en-US" dirty="0"/>
+            <a:t> FHIR R4 Implementation Guide Use Cases</a:t>
+          </a:r>
+        </a:p>
+      </dgm:t>
+    </dgm:pt>
+    <dgm:pt modelId="{2C2C3206-117A-4ED5-801E-DF028385E956}" type="parTrans" cxnId="{78D1A3C9-ED08-41A7-AE9B-F46B31FD2B4D}">
+      <dgm:prSet/>
+      <dgm:spPr/>
+      <dgm:t>
+        <a:bodyPr/>
+        <a:lstStyle/>
+        <a:p>
+          <a:endParaRPr lang="en-US"/>
+        </a:p>
+      </dgm:t>
+    </dgm:pt>
+    <dgm:pt modelId="{F94E149E-7DC5-4AE2-B23D-FA87763051F9}" type="sibTrans" cxnId="{78D1A3C9-ED08-41A7-AE9B-F46B31FD2B4D}">
+      <dgm:prSet/>
+      <dgm:spPr/>
+      <dgm:t>
+        <a:bodyPr/>
+        <a:lstStyle/>
+        <a:p>
+          <a:endParaRPr lang="en-US"/>
+        </a:p>
+      </dgm:t>
+    </dgm:pt>
+    <dgm:pt modelId="{0862A46D-9ED5-4C88-BBBF-396B3B4DDD39}">
+      <dgm:prSet phldrT="[Text]"/>
+      <dgm:spPr/>
+      <dgm:t>
+        <a:bodyPr/>
+        <a:lstStyle/>
+        <a:p>
+          <a:r>
+            <a:rPr lang="en-US" dirty="0"/>
+            <a:t>Obesity</a:t>
+          </a:r>
+        </a:p>
+      </dgm:t>
+    </dgm:pt>
+    <dgm:pt modelId="{637E99F9-430A-4E65-B797-03A0F631158A}" type="parTrans" cxnId="{A1540B2E-117F-485A-B6AC-786A2BA7C59A}">
+      <dgm:prSet/>
+      <dgm:spPr/>
+      <dgm:t>
+        <a:bodyPr/>
+        <a:lstStyle/>
+        <a:p>
+          <a:endParaRPr lang="en-US"/>
+        </a:p>
+      </dgm:t>
+    </dgm:pt>
+    <dgm:pt modelId="{9DA566AE-C528-4FD0-B620-4EBE62A14722}" type="sibTrans" cxnId="{A1540B2E-117F-485A-B6AC-786A2BA7C59A}">
+      <dgm:prSet/>
+      <dgm:spPr/>
+      <dgm:t>
+        <a:bodyPr/>
+        <a:lstStyle/>
+        <a:p>
+          <a:endParaRPr lang="en-US"/>
+        </a:p>
+      </dgm:t>
+    </dgm:pt>
+    <dgm:pt modelId="{B1398821-AE9C-4057-9F6D-5A94B8C613AD}">
+      <dgm:prSet phldrT="[Text]" phldr="1"/>
+      <dgm:spPr/>
+      <dgm:t>
+        <a:bodyPr/>
+        <a:lstStyle/>
+        <a:p>
+          <a:endParaRPr lang="en-US" dirty="0"/>
+        </a:p>
+      </dgm:t>
+    </dgm:pt>
+    <dgm:pt modelId="{2308AB15-B942-4CCE-B007-D22AC6FDFDEF}" type="parTrans" cxnId="{424856C8-9048-4D15-90A0-BAD001914298}">
+      <dgm:prSet/>
+      <dgm:spPr/>
+      <dgm:t>
+        <a:bodyPr/>
+        <a:lstStyle/>
+        <a:p>
+          <a:endParaRPr lang="en-US"/>
+        </a:p>
+      </dgm:t>
+    </dgm:pt>
+    <dgm:pt modelId="{FBBFD345-A521-40E6-A4CB-844ADF0138CF}" type="sibTrans" cxnId="{424856C8-9048-4D15-90A0-BAD001914298}">
+      <dgm:prSet/>
+      <dgm:spPr/>
+      <dgm:t>
+        <a:bodyPr/>
+        <a:lstStyle/>
+        <a:p>
+          <a:endParaRPr lang="en-US"/>
+        </a:p>
+      </dgm:t>
+    </dgm:pt>
+    <dgm:pt modelId="{5E64171D-9786-4FFA-ABBC-6195E7447256}">
+      <dgm:prSet phldrT="[Text]" phldr="1"/>
+      <dgm:spPr/>
+      <dgm:t>
+        <a:bodyPr/>
+        <a:lstStyle/>
+        <a:p>
+          <a:endParaRPr lang="en-US"/>
+        </a:p>
+      </dgm:t>
+    </dgm:pt>
+    <dgm:pt modelId="{9B917618-D9C0-4106-B878-92EB8F2525FF}" type="parTrans" cxnId="{9D5F398C-8E99-42F3-85D1-EC56DA435409}">
+      <dgm:prSet/>
+      <dgm:spPr/>
+      <dgm:t>
+        <a:bodyPr/>
+        <a:lstStyle/>
+        <a:p>
+          <a:endParaRPr lang="en-US"/>
+        </a:p>
+      </dgm:t>
+    </dgm:pt>
+    <dgm:pt modelId="{FD5A047C-57A6-4972-BF6E-A05A9365B4EB}" type="sibTrans" cxnId="{9D5F398C-8E99-42F3-85D1-EC56DA435409}">
+      <dgm:prSet/>
+      <dgm:spPr/>
+      <dgm:t>
+        <a:bodyPr/>
+        <a:lstStyle/>
+        <a:p>
+          <a:endParaRPr lang="en-US"/>
+        </a:p>
+      </dgm:t>
+    </dgm:pt>
+    <dgm:pt modelId="{3AF49399-F9AD-4183-8411-AAE8F375FB17}">
+      <dgm:prSet phldrT="[Text]" phldr="1"/>
+      <dgm:spPr/>
+      <dgm:t>
+        <a:bodyPr/>
+        <a:lstStyle/>
+        <a:p>
+          <a:endParaRPr lang="en-US"/>
+        </a:p>
+      </dgm:t>
+    </dgm:pt>
+    <dgm:pt modelId="{920689DA-3A48-4C29-AC04-0EB58C3F2B8C}" type="parTrans" cxnId="{AF14AE66-1719-4D07-8548-9FC6A7025A09}">
+      <dgm:prSet/>
+      <dgm:spPr/>
+      <dgm:t>
+        <a:bodyPr/>
+        <a:lstStyle/>
+        <a:p>
+          <a:endParaRPr lang="en-US"/>
+        </a:p>
+      </dgm:t>
+    </dgm:pt>
+    <dgm:pt modelId="{1577B26F-07A4-49F8-BA42-532DD7247ABB}" type="sibTrans" cxnId="{AF14AE66-1719-4D07-8548-9FC6A7025A09}">
+      <dgm:prSet/>
+      <dgm:spPr/>
+      <dgm:t>
+        <a:bodyPr/>
+        <a:lstStyle/>
+        <a:p>
+          <a:endParaRPr lang="en-US"/>
+        </a:p>
+      </dgm:t>
+    </dgm:pt>
+    <dgm:pt modelId="{1F7B8D2B-9A92-40AD-B4E3-5A0E0A0ABD5D}" type="pres">
+      <dgm:prSet presAssocID="{1419DA03-AF4E-41BE-882D-0E4EB0944577}" presName="Name0" presStyleCnt="0">
+        <dgm:presLayoutVars>
+          <dgm:chMax val="1"/>
+          <dgm:dir/>
+          <dgm:animLvl val="ctr"/>
+          <dgm:resizeHandles val="exact"/>
+        </dgm:presLayoutVars>
+      </dgm:prSet>
+      <dgm:spPr/>
+    </dgm:pt>
+    <dgm:pt modelId="{EA8F2347-B0D6-4F41-AD0B-A2499495B3FC}" type="pres">
+      <dgm:prSet presAssocID="{45F92551-C2A6-46B5-86B1-7158D6242EFE}" presName="centerShape" presStyleLbl="node0" presStyleIdx="0" presStyleCnt="1"/>
+      <dgm:spPr/>
+    </dgm:pt>
+    <dgm:pt modelId="{52675D95-961E-4B26-8B39-1016D6AE70CD}" type="pres">
+      <dgm:prSet presAssocID="{0862A46D-9ED5-4C88-BBBF-396B3B4DDD39}" presName="node" presStyleLbl="node1" presStyleIdx="0" presStyleCnt="4">
+        <dgm:presLayoutVars>
+          <dgm:bulletEnabled val="1"/>
+        </dgm:presLayoutVars>
+      </dgm:prSet>
+      <dgm:spPr/>
+    </dgm:pt>
+    <dgm:pt modelId="{C475307C-75B5-4165-97E0-E1DAC373227F}" type="pres">
+      <dgm:prSet presAssocID="{0862A46D-9ED5-4C88-BBBF-396B3B4DDD39}" presName="dummy" presStyleCnt="0"/>
+      <dgm:spPr/>
+    </dgm:pt>
+    <dgm:pt modelId="{75884C84-6888-442F-9EC4-26DE8F3ECB26}" type="pres">
+      <dgm:prSet presAssocID="{9DA566AE-C528-4FD0-B620-4EBE62A14722}" presName="sibTrans" presStyleLbl="sibTrans2D1" presStyleIdx="0" presStyleCnt="4"/>
+      <dgm:spPr/>
+    </dgm:pt>
+    <dgm:pt modelId="{A794D366-8B3A-4109-8476-EF344AD54A9C}" type="pres">
+      <dgm:prSet presAssocID="{B1398821-AE9C-4057-9F6D-5A94B8C613AD}" presName="node" presStyleLbl="node1" presStyleIdx="1" presStyleCnt="4">
+        <dgm:presLayoutVars>
+          <dgm:bulletEnabled val="1"/>
+        </dgm:presLayoutVars>
+      </dgm:prSet>
+      <dgm:spPr/>
+    </dgm:pt>
+    <dgm:pt modelId="{3A49A70F-C76A-4176-878F-AEDD86C9215A}" type="pres">
+      <dgm:prSet presAssocID="{B1398821-AE9C-4057-9F6D-5A94B8C613AD}" presName="dummy" presStyleCnt="0"/>
+      <dgm:spPr/>
+    </dgm:pt>
+    <dgm:pt modelId="{78D2353E-968B-44C1-A7A2-5AE6C4353DBA}" type="pres">
+      <dgm:prSet presAssocID="{FBBFD345-A521-40E6-A4CB-844ADF0138CF}" presName="sibTrans" presStyleLbl="sibTrans2D1" presStyleIdx="1" presStyleCnt="4"/>
+      <dgm:spPr/>
+    </dgm:pt>
+    <dgm:pt modelId="{0DB45D44-9EB4-4621-A55C-9ECABA5B3E3A}" type="pres">
+      <dgm:prSet presAssocID="{5E64171D-9786-4FFA-ABBC-6195E7447256}" presName="node" presStyleLbl="node1" presStyleIdx="2" presStyleCnt="4">
+        <dgm:presLayoutVars>
+          <dgm:bulletEnabled val="1"/>
+        </dgm:presLayoutVars>
+      </dgm:prSet>
+      <dgm:spPr/>
+    </dgm:pt>
+    <dgm:pt modelId="{7FAA7A18-72C2-41D9-8FC9-00CC68556E50}" type="pres">
+      <dgm:prSet presAssocID="{5E64171D-9786-4FFA-ABBC-6195E7447256}" presName="dummy" presStyleCnt="0"/>
+      <dgm:spPr/>
+    </dgm:pt>
+    <dgm:pt modelId="{CDC3DCF4-C7D8-4261-883D-658AA916C2AB}" type="pres">
+      <dgm:prSet presAssocID="{FD5A047C-57A6-4972-BF6E-A05A9365B4EB}" presName="sibTrans" presStyleLbl="sibTrans2D1" presStyleIdx="2" presStyleCnt="4"/>
+      <dgm:spPr/>
+    </dgm:pt>
+    <dgm:pt modelId="{B0456413-33E6-4378-AA1A-E58DC3CCF63A}" type="pres">
+      <dgm:prSet presAssocID="{3AF49399-F9AD-4183-8411-AAE8F375FB17}" presName="node" presStyleLbl="node1" presStyleIdx="3" presStyleCnt="4">
+        <dgm:presLayoutVars>
+          <dgm:bulletEnabled val="1"/>
+        </dgm:presLayoutVars>
+      </dgm:prSet>
+      <dgm:spPr/>
+    </dgm:pt>
+    <dgm:pt modelId="{85176AE7-576D-48FF-9F55-6A487904B2D7}" type="pres">
+      <dgm:prSet presAssocID="{3AF49399-F9AD-4183-8411-AAE8F375FB17}" presName="dummy" presStyleCnt="0"/>
+      <dgm:spPr/>
+    </dgm:pt>
+    <dgm:pt modelId="{5C579B89-F5D9-4E59-AEEF-0A758F8DBAFC}" type="pres">
+      <dgm:prSet presAssocID="{1577B26F-07A4-49F8-BA42-532DD7247ABB}" presName="sibTrans" presStyleLbl="sibTrans2D1" presStyleIdx="3" presStyleCnt="4"/>
+      <dgm:spPr/>
+    </dgm:pt>
+  </dgm:ptLst>
+  <dgm:cxnLst>
+    <dgm:cxn modelId="{7B1CC617-2058-4126-B9FE-E57A1B322E3C}" type="presOf" srcId="{3AF49399-F9AD-4183-8411-AAE8F375FB17}" destId="{B0456413-33E6-4378-AA1A-E58DC3CCF63A}" srcOrd="0" destOrd="0" presId="urn:microsoft.com/office/officeart/2005/8/layout/radial6"/>
+    <dgm:cxn modelId="{98101F1D-09EC-4B9B-9A12-ECCDA5621853}" type="presOf" srcId="{9DA566AE-C528-4FD0-B620-4EBE62A14722}" destId="{75884C84-6888-442F-9EC4-26DE8F3ECB26}" srcOrd="0" destOrd="0" presId="urn:microsoft.com/office/officeart/2005/8/layout/radial6"/>
+    <dgm:cxn modelId="{1658312D-D101-4455-BB54-B9A8160B8859}" type="presOf" srcId="{0862A46D-9ED5-4C88-BBBF-396B3B4DDD39}" destId="{52675D95-961E-4B26-8B39-1016D6AE70CD}" srcOrd="0" destOrd="0" presId="urn:microsoft.com/office/officeart/2005/8/layout/radial6"/>
+    <dgm:cxn modelId="{A1540B2E-117F-485A-B6AC-786A2BA7C59A}" srcId="{45F92551-C2A6-46B5-86B1-7158D6242EFE}" destId="{0862A46D-9ED5-4C88-BBBF-396B3B4DDD39}" srcOrd="0" destOrd="0" parTransId="{637E99F9-430A-4E65-B797-03A0F631158A}" sibTransId="{9DA566AE-C528-4FD0-B620-4EBE62A14722}"/>
+    <dgm:cxn modelId="{81A0F862-FDE6-46E2-A7D4-8402B72AD0B7}" type="presOf" srcId="{FBBFD345-A521-40E6-A4CB-844ADF0138CF}" destId="{78D2353E-968B-44C1-A7A2-5AE6C4353DBA}" srcOrd="0" destOrd="0" presId="urn:microsoft.com/office/officeart/2005/8/layout/radial6"/>
+    <dgm:cxn modelId="{AF14AE66-1719-4D07-8548-9FC6A7025A09}" srcId="{45F92551-C2A6-46B5-86B1-7158D6242EFE}" destId="{3AF49399-F9AD-4183-8411-AAE8F375FB17}" srcOrd="3" destOrd="0" parTransId="{920689DA-3A48-4C29-AC04-0EB58C3F2B8C}" sibTransId="{1577B26F-07A4-49F8-BA42-532DD7247ABB}"/>
+    <dgm:cxn modelId="{7F676656-ED0B-46CC-9A86-10C80B8BD900}" type="presOf" srcId="{FD5A047C-57A6-4972-BF6E-A05A9365B4EB}" destId="{CDC3DCF4-C7D8-4261-883D-658AA916C2AB}" srcOrd="0" destOrd="0" presId="urn:microsoft.com/office/officeart/2005/8/layout/radial6"/>
+    <dgm:cxn modelId="{E8724A8A-7B81-4BBC-AC0C-D9DE6567FA02}" type="presOf" srcId="{5E64171D-9786-4FFA-ABBC-6195E7447256}" destId="{0DB45D44-9EB4-4621-A55C-9ECABA5B3E3A}" srcOrd="0" destOrd="0" presId="urn:microsoft.com/office/officeart/2005/8/layout/radial6"/>
+    <dgm:cxn modelId="{9D5F398C-8E99-42F3-85D1-EC56DA435409}" srcId="{45F92551-C2A6-46B5-86B1-7158D6242EFE}" destId="{5E64171D-9786-4FFA-ABBC-6195E7447256}" srcOrd="2" destOrd="0" parTransId="{9B917618-D9C0-4106-B878-92EB8F2525FF}" sibTransId="{FD5A047C-57A6-4972-BF6E-A05A9365B4EB}"/>
+    <dgm:cxn modelId="{18A868A9-7FAE-4649-A180-8FCB385C0D99}" type="presOf" srcId="{1577B26F-07A4-49F8-BA42-532DD7247ABB}" destId="{5C579B89-F5D9-4E59-AEEF-0A758F8DBAFC}" srcOrd="0" destOrd="0" presId="urn:microsoft.com/office/officeart/2005/8/layout/radial6"/>
+    <dgm:cxn modelId="{3C0209BA-25C5-41C6-94AE-9BF23299EE07}" type="presOf" srcId="{B1398821-AE9C-4057-9F6D-5A94B8C613AD}" destId="{A794D366-8B3A-4109-8476-EF344AD54A9C}" srcOrd="0" destOrd="0" presId="urn:microsoft.com/office/officeart/2005/8/layout/radial6"/>
+    <dgm:cxn modelId="{424856C8-9048-4D15-90A0-BAD001914298}" srcId="{45F92551-C2A6-46B5-86B1-7158D6242EFE}" destId="{B1398821-AE9C-4057-9F6D-5A94B8C613AD}" srcOrd="1" destOrd="0" parTransId="{2308AB15-B942-4CCE-B007-D22AC6FDFDEF}" sibTransId="{FBBFD345-A521-40E6-A4CB-844ADF0138CF}"/>
+    <dgm:cxn modelId="{78D1A3C9-ED08-41A7-AE9B-F46B31FD2B4D}" srcId="{1419DA03-AF4E-41BE-882D-0E4EB0944577}" destId="{45F92551-C2A6-46B5-86B1-7158D6242EFE}" srcOrd="0" destOrd="0" parTransId="{2C2C3206-117A-4ED5-801E-DF028385E956}" sibTransId="{F94E149E-7DC5-4AE2-B23D-FA87763051F9}"/>
+    <dgm:cxn modelId="{C74FA1E7-AFD2-416B-93A1-25B372086A7C}" type="presOf" srcId="{1419DA03-AF4E-41BE-882D-0E4EB0944577}" destId="{1F7B8D2B-9A92-40AD-B4E3-5A0E0A0ABD5D}" srcOrd="0" destOrd="0" presId="urn:microsoft.com/office/officeart/2005/8/layout/radial6"/>
+    <dgm:cxn modelId="{4B7C1BEE-9B88-45F3-B15F-28603439DD99}" type="presOf" srcId="{45F92551-C2A6-46B5-86B1-7158D6242EFE}" destId="{EA8F2347-B0D6-4F41-AD0B-A2499495B3FC}" srcOrd="0" destOrd="0" presId="urn:microsoft.com/office/officeart/2005/8/layout/radial6"/>
+    <dgm:cxn modelId="{5AA9104D-1EE1-4145-985A-63C93673260D}" type="presParOf" srcId="{1F7B8D2B-9A92-40AD-B4E3-5A0E0A0ABD5D}" destId="{EA8F2347-B0D6-4F41-AD0B-A2499495B3FC}" srcOrd="0" destOrd="0" presId="urn:microsoft.com/office/officeart/2005/8/layout/radial6"/>
+    <dgm:cxn modelId="{6456B844-2FB4-4C20-81D5-6550A7C454FF}" type="presParOf" srcId="{1F7B8D2B-9A92-40AD-B4E3-5A0E0A0ABD5D}" destId="{52675D95-961E-4B26-8B39-1016D6AE70CD}" srcOrd="1" destOrd="0" presId="urn:microsoft.com/office/officeart/2005/8/layout/radial6"/>
+    <dgm:cxn modelId="{1783305C-A985-4CCF-A5FC-1E3D60F3C774}" type="presParOf" srcId="{1F7B8D2B-9A92-40AD-B4E3-5A0E0A0ABD5D}" destId="{C475307C-75B5-4165-97E0-E1DAC373227F}" srcOrd="2" destOrd="0" presId="urn:microsoft.com/office/officeart/2005/8/layout/radial6"/>
+    <dgm:cxn modelId="{819306BA-DFEC-404C-993C-BD60BCD53DBA}" type="presParOf" srcId="{1F7B8D2B-9A92-40AD-B4E3-5A0E0A0ABD5D}" destId="{75884C84-6888-442F-9EC4-26DE8F3ECB26}" srcOrd="3" destOrd="0" presId="urn:microsoft.com/office/officeart/2005/8/layout/radial6"/>
+    <dgm:cxn modelId="{920BCB49-8135-455B-8A35-D678C27817FF}" type="presParOf" srcId="{1F7B8D2B-9A92-40AD-B4E3-5A0E0A0ABD5D}" destId="{A794D366-8B3A-4109-8476-EF344AD54A9C}" srcOrd="4" destOrd="0" presId="urn:microsoft.com/office/officeart/2005/8/layout/radial6"/>
+    <dgm:cxn modelId="{970BDD30-B7EF-4D19-ACBB-BD1C60D8795D}" type="presParOf" srcId="{1F7B8D2B-9A92-40AD-B4E3-5A0E0A0ABD5D}" destId="{3A49A70F-C76A-4176-878F-AEDD86C9215A}" srcOrd="5" destOrd="0" presId="urn:microsoft.com/office/officeart/2005/8/layout/radial6"/>
+    <dgm:cxn modelId="{EFC4801A-89B5-4E7F-8054-0C011BFFF786}" type="presParOf" srcId="{1F7B8D2B-9A92-40AD-B4E3-5A0E0A0ABD5D}" destId="{78D2353E-968B-44C1-A7A2-5AE6C4353DBA}" srcOrd="6" destOrd="0" presId="urn:microsoft.com/office/officeart/2005/8/layout/radial6"/>
+    <dgm:cxn modelId="{E8C96E06-BC8C-4E60-968E-EA84F46BDADB}" type="presParOf" srcId="{1F7B8D2B-9A92-40AD-B4E3-5A0E0A0ABD5D}" destId="{0DB45D44-9EB4-4621-A55C-9ECABA5B3E3A}" srcOrd="7" destOrd="0" presId="urn:microsoft.com/office/officeart/2005/8/layout/radial6"/>
+    <dgm:cxn modelId="{0079D8EB-017E-4DA7-B6A0-A041C0E1BFBF}" type="presParOf" srcId="{1F7B8D2B-9A92-40AD-B4E3-5A0E0A0ABD5D}" destId="{7FAA7A18-72C2-41D9-8FC9-00CC68556E50}" srcOrd="8" destOrd="0" presId="urn:microsoft.com/office/officeart/2005/8/layout/radial6"/>
+    <dgm:cxn modelId="{C0D3FA0E-C290-4711-B4F1-074C494EFC86}" type="presParOf" srcId="{1F7B8D2B-9A92-40AD-B4E3-5A0E0A0ABD5D}" destId="{CDC3DCF4-C7D8-4261-883D-658AA916C2AB}" srcOrd="9" destOrd="0" presId="urn:microsoft.com/office/officeart/2005/8/layout/radial6"/>
+    <dgm:cxn modelId="{2D3FF45B-1D29-45F5-8D83-9E35C581729A}" type="presParOf" srcId="{1F7B8D2B-9A92-40AD-B4E3-5A0E0A0ABD5D}" destId="{B0456413-33E6-4378-AA1A-E58DC3CCF63A}" srcOrd="10" destOrd="0" presId="urn:microsoft.com/office/officeart/2005/8/layout/radial6"/>
+    <dgm:cxn modelId="{9C9FDDDF-31F9-4745-994B-C416BA1D041A}" type="presParOf" srcId="{1F7B8D2B-9A92-40AD-B4E3-5A0E0A0ABD5D}" destId="{85176AE7-576D-48FF-9F55-6A487904B2D7}" srcOrd="11" destOrd="0" presId="urn:microsoft.com/office/officeart/2005/8/layout/radial6"/>
+    <dgm:cxn modelId="{7BA9F5E7-9E01-4C9E-9868-81FAF596EFCE}" type="presParOf" srcId="{1F7B8D2B-9A92-40AD-B4E3-5A0E0A0ABD5D}" destId="{5C579B89-F5D9-4E59-AEEF-0A758F8DBAFC}" srcOrd="12" destOrd="0" presId="urn:microsoft.com/office/officeart/2005/8/layout/radial6"/>
+  </dgm:cxnLst>
+  <dgm:bg/>
+  <dgm:whole/>
+  <dgm:extLst>
+    <a:ext uri="http://schemas.microsoft.com/office/drawing/2008/diagram">
+      <dsp:dataModelExt xmlns:dsp="http://schemas.microsoft.com/office/drawing/2008/diagram" relId="rId6" minVer="http://schemas.openxmlformats.org/drawingml/2006/diagram"/>
+    </a:ext>
+  </dgm:extLst>
+</dgm:dataModel>
+</file>
+
+<file path=ppt/diagrams/drawing1.xml><?xml version="1.0" encoding="utf-8"?>
+<dsp:drawing xmlns:dgm="http://schemas.openxmlformats.org/drawingml/2006/diagram" xmlns:dsp="http://schemas.microsoft.com/office/drawing/2008/diagram" xmlns:a="http://schemas.openxmlformats.org/drawingml/2006/main">
+  <dsp:spTree>
+    <dsp:nvGrpSpPr>
+      <dsp:cNvPr id="0" name=""/>
+      <dsp:cNvGrpSpPr/>
+    </dsp:nvGrpSpPr>
+    <dsp:grpSpPr/>
+    <dsp:sp modelId="{5C579B89-F5D9-4E59-AEEF-0A758F8DBAFC}">
+      <dsp:nvSpPr>
+        <dsp:cNvPr id="0" name=""/>
+        <dsp:cNvSpPr/>
+      </dsp:nvSpPr>
+      <dsp:spPr>
+        <a:xfrm>
+          <a:off x="1686676" y="532916"/>
+          <a:ext cx="3549206" cy="3549206"/>
+        </a:xfrm>
+        <a:prstGeom prst="blockArc">
+          <a:avLst>
+            <a:gd name="adj1" fmla="val 10800000"/>
+            <a:gd name="adj2" fmla="val 16200000"/>
+            <a:gd name="adj3" fmla="val 4642"/>
+          </a:avLst>
+        </a:prstGeom>
+        <a:solidFill>
+          <a:schemeClr val="accent3">
+            <a:hueOff val="-4203570"/>
+            <a:satOff val="50380"/>
+            <a:lumOff val="-13921"/>
+            <a:alphaOff val="0"/>
+          </a:schemeClr>
+        </a:solidFill>
+        <a:ln>
+          <a:noFill/>
+        </a:ln>
+        <a:effectLst/>
+      </dsp:spPr>
+      <dsp:style>
+        <a:lnRef idx="0">
+          <a:scrgbClr r="0" g="0" b="0"/>
+        </a:lnRef>
+        <a:fillRef idx="1">
+          <a:scrgbClr r="0" g="0" b="0"/>
+        </a:fillRef>
+        <a:effectRef idx="0">
+          <a:scrgbClr r="0" g="0" b="0"/>
+        </a:effectRef>
+        <a:fontRef idx="minor">
+          <a:schemeClr val="lt1"/>
+        </a:fontRef>
+      </dsp:style>
+    </dsp:sp>
+    <dsp:sp modelId="{CDC3DCF4-C7D8-4261-883D-658AA916C2AB}">
+      <dsp:nvSpPr>
+        <dsp:cNvPr id="0" name=""/>
+        <dsp:cNvSpPr/>
+      </dsp:nvSpPr>
+      <dsp:spPr>
+        <a:xfrm>
+          <a:off x="1686676" y="532916"/>
+          <a:ext cx="3549206" cy="3549206"/>
+        </a:xfrm>
+        <a:prstGeom prst="blockArc">
+          <a:avLst>
+            <a:gd name="adj1" fmla="val 5400000"/>
+            <a:gd name="adj2" fmla="val 10800000"/>
+            <a:gd name="adj3" fmla="val 4642"/>
+          </a:avLst>
+        </a:prstGeom>
+        <a:solidFill>
+          <a:schemeClr val="accent3">
+            <a:hueOff val="-2802380"/>
+            <a:satOff val="33587"/>
+            <a:lumOff val="-9281"/>
+            <a:alphaOff val="0"/>
+          </a:schemeClr>
+        </a:solidFill>
+        <a:ln>
+          <a:noFill/>
+        </a:ln>
+        <a:effectLst/>
+      </dsp:spPr>
+      <dsp:style>
+        <a:lnRef idx="0">
+          <a:scrgbClr r="0" g="0" b="0"/>
+        </a:lnRef>
+        <a:fillRef idx="1">
+          <a:scrgbClr r="0" g="0" b="0"/>
+        </a:fillRef>
+        <a:effectRef idx="0">
+          <a:scrgbClr r="0" g="0" b="0"/>
+        </a:effectRef>
+        <a:fontRef idx="minor">
+          <a:schemeClr val="lt1"/>
+        </a:fontRef>
+      </dsp:style>
+    </dsp:sp>
+    <dsp:sp modelId="{78D2353E-968B-44C1-A7A2-5AE6C4353DBA}">
+      <dsp:nvSpPr>
+        <dsp:cNvPr id="0" name=""/>
+        <dsp:cNvSpPr/>
+      </dsp:nvSpPr>
+      <dsp:spPr>
+        <a:xfrm>
+          <a:off x="1686676" y="532916"/>
+          <a:ext cx="3549206" cy="3549206"/>
+        </a:xfrm>
+        <a:prstGeom prst="blockArc">
+          <a:avLst>
+            <a:gd name="adj1" fmla="val 0"/>
+            <a:gd name="adj2" fmla="val 5400000"/>
+            <a:gd name="adj3" fmla="val 4642"/>
+          </a:avLst>
+        </a:prstGeom>
+        <a:solidFill>
+          <a:schemeClr val="accent3">
+            <a:hueOff val="-1401190"/>
+            <a:satOff val="16793"/>
+            <a:lumOff val="-4640"/>
+            <a:alphaOff val="0"/>
+          </a:schemeClr>
+        </a:solidFill>
+        <a:ln>
+          <a:noFill/>
+        </a:ln>
+        <a:effectLst/>
+      </dsp:spPr>
+      <dsp:style>
+        <a:lnRef idx="0">
+          <a:scrgbClr r="0" g="0" b="0"/>
+        </a:lnRef>
+        <a:fillRef idx="1">
+          <a:scrgbClr r="0" g="0" b="0"/>
+        </a:fillRef>
+        <a:effectRef idx="0">
+          <a:scrgbClr r="0" g="0" b="0"/>
+        </a:effectRef>
+        <a:fontRef idx="minor">
+          <a:schemeClr val="lt1"/>
+        </a:fontRef>
+      </dsp:style>
+    </dsp:sp>
+    <dsp:sp modelId="{75884C84-6888-442F-9EC4-26DE8F3ECB26}">
+      <dsp:nvSpPr>
+        <dsp:cNvPr id="0" name=""/>
+        <dsp:cNvSpPr/>
+      </dsp:nvSpPr>
+      <dsp:spPr>
+        <a:xfrm>
+          <a:off x="1686676" y="532916"/>
+          <a:ext cx="3549206" cy="3549206"/>
+        </a:xfrm>
+        <a:prstGeom prst="blockArc">
+          <a:avLst>
+            <a:gd name="adj1" fmla="val 16200000"/>
+            <a:gd name="adj2" fmla="val 0"/>
+            <a:gd name="adj3" fmla="val 4642"/>
+          </a:avLst>
+        </a:prstGeom>
+        <a:solidFill>
+          <a:schemeClr val="accent3">
+            <a:hueOff val="0"/>
+            <a:satOff val="0"/>
+            <a:lumOff val="0"/>
+            <a:alphaOff val="0"/>
+          </a:schemeClr>
+        </a:solidFill>
+        <a:ln>
+          <a:noFill/>
+        </a:ln>
+        <a:effectLst/>
+      </dsp:spPr>
+      <dsp:style>
+        <a:lnRef idx="0">
+          <a:scrgbClr r="0" g="0" b="0"/>
+        </a:lnRef>
+        <a:fillRef idx="1">
+          <a:scrgbClr r="0" g="0" b="0"/>
+        </a:fillRef>
+        <a:effectRef idx="0">
+          <a:scrgbClr r="0" g="0" b="0"/>
+        </a:effectRef>
+        <a:fontRef idx="minor">
+          <a:schemeClr val="lt1"/>
+        </a:fontRef>
+      </dsp:style>
+    </dsp:sp>
+    <dsp:sp modelId="{EA8F2347-B0D6-4F41-AD0B-A2499495B3FC}">
+      <dsp:nvSpPr>
+        <dsp:cNvPr id="0" name=""/>
+        <dsp:cNvSpPr/>
+      </dsp:nvSpPr>
+      <dsp:spPr>
+        <a:xfrm>
+          <a:off x="2644126" y="1490366"/>
+          <a:ext cx="1634305" cy="1634305"/>
+        </a:xfrm>
+        <a:prstGeom prst="ellipse">
+          <a:avLst/>
+        </a:prstGeom>
+        <a:solidFill>
+          <a:schemeClr val="accent2">
+            <a:hueOff val="0"/>
+            <a:satOff val="0"/>
+            <a:lumOff val="0"/>
+            <a:alphaOff val="0"/>
+          </a:schemeClr>
+        </a:solidFill>
+        <a:ln w="12700" cap="flat" cmpd="sng" algn="ctr">
+          <a:solidFill>
+            <a:schemeClr val="lt1">
+              <a:hueOff val="0"/>
+              <a:satOff val="0"/>
+              <a:lumOff val="0"/>
+              <a:alphaOff val="0"/>
+            </a:schemeClr>
+          </a:solidFill>
+          <a:prstDash val="solid"/>
+          <a:miter lim="800000"/>
+        </a:ln>
+        <a:effectLst/>
+      </dsp:spPr>
+      <dsp:style>
+        <a:lnRef idx="2">
+          <a:scrgbClr r="0" g="0" b="0"/>
+        </a:lnRef>
+        <a:fillRef idx="1">
+          <a:scrgbClr r="0" g="0" b="0"/>
+        </a:fillRef>
+        <a:effectRef idx="0">
+          <a:scrgbClr r="0" g="0" b="0"/>
+        </a:effectRef>
+        <a:fontRef idx="minor">
+          <a:schemeClr val="lt1"/>
+        </a:fontRef>
+      </dsp:style>
+      <dsp:txBody>
+        <a:bodyPr spcFirstLastPara="0" vert="horz" wrap="square" lIns="15240" tIns="15240" rIns="15240" bIns="15240" numCol="1" spcCol="1270" anchor="ctr" anchorCtr="0">
+          <a:noAutofit/>
+        </a:bodyPr>
+        <a:lstStyle/>
+        <a:p>
+          <a:pPr marL="0" lvl="0" indent="0" algn="ctr" defTabSz="533400">
+            <a:lnSpc>
+              <a:spcPct val="90000"/>
+            </a:lnSpc>
+            <a:spcBef>
+              <a:spcPct val="0"/>
+            </a:spcBef>
+            <a:spcAft>
+              <a:spcPct val="35000"/>
+            </a:spcAft>
+            <a:buNone/>
+          </a:pPr>
+          <a:r>
+            <a:rPr lang="en-US" sz="1200" kern="1200" dirty="0" err="1"/>
+            <a:t>BSeR</a:t>
+          </a:r>
+          <a:r>
+            <a:rPr lang="en-US" sz="1200" kern="1200" dirty="0"/>
+            <a:t> FHIR R4 Implementation Guide Use Cases</a:t>
+          </a:r>
+        </a:p>
+      </dsp:txBody>
+      <dsp:txXfrm>
+        <a:off x="2883464" y="1729704"/>
+        <a:ext cx="1155629" cy="1155629"/>
+      </dsp:txXfrm>
+    </dsp:sp>
+    <dsp:sp modelId="{52675D95-961E-4B26-8B39-1016D6AE70CD}">
+      <dsp:nvSpPr>
+        <dsp:cNvPr id="0" name=""/>
+        <dsp:cNvSpPr/>
+      </dsp:nvSpPr>
+      <dsp:spPr>
+        <a:xfrm>
+          <a:off x="2889272" y="2093"/>
+          <a:ext cx="1144013" cy="1144013"/>
+        </a:xfrm>
+        <a:prstGeom prst="ellipse">
+          <a:avLst/>
+        </a:prstGeom>
+        <a:solidFill>
+          <a:schemeClr val="accent3">
+            <a:hueOff val="0"/>
+            <a:satOff val="0"/>
+            <a:lumOff val="0"/>
+            <a:alphaOff val="0"/>
+          </a:schemeClr>
+        </a:solidFill>
+        <a:ln w="12700" cap="flat" cmpd="sng" algn="ctr">
+          <a:solidFill>
+            <a:schemeClr val="lt1">
+              <a:hueOff val="0"/>
+              <a:satOff val="0"/>
+              <a:lumOff val="0"/>
+              <a:alphaOff val="0"/>
+            </a:schemeClr>
+          </a:solidFill>
+          <a:prstDash val="solid"/>
+          <a:miter lim="800000"/>
+        </a:ln>
+        <a:effectLst/>
+      </dsp:spPr>
+      <dsp:style>
+        <a:lnRef idx="2">
+          <a:scrgbClr r="0" g="0" b="0"/>
+        </a:lnRef>
+        <a:fillRef idx="1">
+          <a:scrgbClr r="0" g="0" b="0"/>
+        </a:fillRef>
+        <a:effectRef idx="0">
+          <a:scrgbClr r="0" g="0" b="0"/>
+        </a:effectRef>
+        <a:fontRef idx="minor">
+          <a:schemeClr val="lt1"/>
+        </a:fontRef>
+      </dsp:style>
+      <dsp:txBody>
+        <a:bodyPr spcFirstLastPara="0" vert="horz" wrap="square" lIns="13970" tIns="13970" rIns="13970" bIns="13970" numCol="1" spcCol="1270" anchor="ctr" anchorCtr="0">
+          <a:noAutofit/>
+        </a:bodyPr>
+        <a:lstStyle/>
+        <a:p>
+          <a:pPr marL="0" lvl="0" indent="0" algn="ctr" defTabSz="488950">
+            <a:lnSpc>
+              <a:spcPct val="90000"/>
+            </a:lnSpc>
+            <a:spcBef>
+              <a:spcPct val="0"/>
+            </a:spcBef>
+            <a:spcAft>
+              <a:spcPct val="35000"/>
+            </a:spcAft>
+            <a:buNone/>
+          </a:pPr>
+          <a:r>
+            <a:rPr lang="en-US" sz="1100" kern="1200" dirty="0"/>
+            <a:t>Obesity</a:t>
+          </a:r>
+        </a:p>
+      </dsp:txBody>
+      <dsp:txXfrm>
+        <a:off x="3056809" y="169630"/>
+        <a:ext cx="808939" cy="808939"/>
+      </dsp:txXfrm>
+    </dsp:sp>
+    <dsp:sp modelId="{A794D366-8B3A-4109-8476-EF344AD54A9C}">
+      <dsp:nvSpPr>
+        <dsp:cNvPr id="0" name=""/>
+        <dsp:cNvSpPr/>
+      </dsp:nvSpPr>
+      <dsp:spPr>
+        <a:xfrm>
+          <a:off x="4622691" y="1735512"/>
+          <a:ext cx="1144013" cy="1144013"/>
+        </a:xfrm>
+        <a:prstGeom prst="ellipse">
+          <a:avLst/>
+        </a:prstGeom>
+        <a:solidFill>
+          <a:schemeClr val="accent3">
+            <a:hueOff val="-1401190"/>
+            <a:satOff val="16793"/>
+            <a:lumOff val="-4640"/>
+            <a:alphaOff val="0"/>
+          </a:schemeClr>
+        </a:solidFill>
+        <a:ln w="12700" cap="flat" cmpd="sng" algn="ctr">
+          <a:solidFill>
+            <a:schemeClr val="lt1">
+              <a:hueOff val="0"/>
+              <a:satOff val="0"/>
+              <a:lumOff val="0"/>
+              <a:alphaOff val="0"/>
+            </a:schemeClr>
+          </a:solidFill>
+          <a:prstDash val="solid"/>
+          <a:miter lim="800000"/>
+        </a:ln>
+        <a:effectLst/>
+      </dsp:spPr>
+      <dsp:style>
+        <a:lnRef idx="2">
+          <a:scrgbClr r="0" g="0" b="0"/>
+        </a:lnRef>
+        <a:fillRef idx="1">
+          <a:scrgbClr r="0" g="0" b="0"/>
+        </a:fillRef>
+        <a:effectRef idx="0">
+          <a:scrgbClr r="0" g="0" b="0"/>
+        </a:effectRef>
+        <a:fontRef idx="minor">
+          <a:schemeClr val="lt1"/>
+        </a:fontRef>
+      </dsp:style>
+      <dsp:txBody>
+        <a:bodyPr spcFirstLastPara="0" vert="horz" wrap="square" lIns="13970" tIns="13970" rIns="13970" bIns="13970" numCol="1" spcCol="1270" anchor="ctr" anchorCtr="0">
+          <a:noAutofit/>
+        </a:bodyPr>
+        <a:lstStyle/>
+        <a:p>
+          <a:pPr marL="0" lvl="0" indent="0" algn="ctr" defTabSz="488950">
+            <a:lnSpc>
+              <a:spcPct val="90000"/>
+            </a:lnSpc>
+            <a:spcBef>
+              <a:spcPct val="0"/>
+            </a:spcBef>
+            <a:spcAft>
+              <a:spcPct val="35000"/>
+            </a:spcAft>
+            <a:buNone/>
+          </a:pPr>
+          <a:endParaRPr lang="en-US" sz="1100" kern="1200"/>
+        </a:p>
+      </dsp:txBody>
+      <dsp:txXfrm>
+        <a:off x="4790228" y="1903049"/>
+        <a:ext cx="808939" cy="808939"/>
+      </dsp:txXfrm>
+    </dsp:sp>
+    <dsp:sp modelId="{0DB45D44-9EB4-4621-A55C-9ECABA5B3E3A}">
+      <dsp:nvSpPr>
+        <dsp:cNvPr id="0" name=""/>
+        <dsp:cNvSpPr/>
+      </dsp:nvSpPr>
+      <dsp:spPr>
+        <a:xfrm>
+          <a:off x="2889272" y="3468931"/>
+          <a:ext cx="1144013" cy="1144013"/>
+        </a:xfrm>
+        <a:prstGeom prst="ellipse">
+          <a:avLst/>
+        </a:prstGeom>
+        <a:solidFill>
+          <a:schemeClr val="accent3">
+            <a:hueOff val="-2802380"/>
+            <a:satOff val="33587"/>
+            <a:lumOff val="-9281"/>
+            <a:alphaOff val="0"/>
+          </a:schemeClr>
+        </a:solidFill>
+        <a:ln w="12700" cap="flat" cmpd="sng" algn="ctr">
+          <a:solidFill>
+            <a:schemeClr val="lt1">
+              <a:hueOff val="0"/>
+              <a:satOff val="0"/>
+              <a:lumOff val="0"/>
+              <a:alphaOff val="0"/>
+            </a:schemeClr>
+          </a:solidFill>
+          <a:prstDash val="solid"/>
+          <a:miter lim="800000"/>
+        </a:ln>
+        <a:effectLst/>
+      </dsp:spPr>
+      <dsp:style>
+        <a:lnRef idx="2">
+          <a:scrgbClr r="0" g="0" b="0"/>
+        </a:lnRef>
+        <a:fillRef idx="1">
+          <a:scrgbClr r="0" g="0" b="0"/>
+        </a:fillRef>
+        <a:effectRef idx="0">
+          <a:scrgbClr r="0" g="0" b="0"/>
+        </a:effectRef>
+        <a:fontRef idx="minor">
+          <a:schemeClr val="lt1"/>
+        </a:fontRef>
+      </dsp:style>
+      <dsp:txBody>
+        <a:bodyPr spcFirstLastPara="0" vert="horz" wrap="square" lIns="13970" tIns="13970" rIns="13970" bIns="13970" numCol="1" spcCol="1270" anchor="ctr" anchorCtr="0">
+          <a:noAutofit/>
+        </a:bodyPr>
+        <a:lstStyle/>
+        <a:p>
+          <a:pPr marL="0" lvl="0" indent="0" algn="ctr" defTabSz="488950">
+            <a:lnSpc>
+              <a:spcPct val="90000"/>
+            </a:lnSpc>
+            <a:spcBef>
+              <a:spcPct val="0"/>
+            </a:spcBef>
+            <a:spcAft>
+              <a:spcPct val="35000"/>
+            </a:spcAft>
+            <a:buNone/>
+          </a:pPr>
+          <a:endParaRPr lang="en-US" sz="1100" kern="1200"/>
+        </a:p>
+      </dsp:txBody>
+      <dsp:txXfrm>
+        <a:off x="3056809" y="3636468"/>
+        <a:ext cx="808939" cy="808939"/>
+      </dsp:txXfrm>
+    </dsp:sp>
+    <dsp:sp modelId="{B0456413-33E6-4378-AA1A-E58DC3CCF63A}">
+      <dsp:nvSpPr>
+        <dsp:cNvPr id="0" name=""/>
+        <dsp:cNvSpPr/>
+      </dsp:nvSpPr>
+      <dsp:spPr>
+        <a:xfrm>
+          <a:off x="1155853" y="1735512"/>
+          <a:ext cx="1144013" cy="1144013"/>
+        </a:xfrm>
+        <a:prstGeom prst="ellipse">
+          <a:avLst/>
+        </a:prstGeom>
+        <a:solidFill>
+          <a:schemeClr val="accent3">
+            <a:hueOff val="-4203570"/>
+            <a:satOff val="50380"/>
+            <a:lumOff val="-13921"/>
+            <a:alphaOff val="0"/>
+          </a:schemeClr>
+        </a:solidFill>
+        <a:ln w="12700" cap="flat" cmpd="sng" algn="ctr">
+          <a:solidFill>
+            <a:schemeClr val="lt1">
+              <a:hueOff val="0"/>
+              <a:satOff val="0"/>
+              <a:lumOff val="0"/>
+              <a:alphaOff val="0"/>
+            </a:schemeClr>
+          </a:solidFill>
+          <a:prstDash val="solid"/>
+          <a:miter lim="800000"/>
+        </a:ln>
+        <a:effectLst/>
+      </dsp:spPr>
+      <dsp:style>
+        <a:lnRef idx="2">
+          <a:scrgbClr r="0" g="0" b="0"/>
+        </a:lnRef>
+        <a:fillRef idx="1">
+          <a:scrgbClr r="0" g="0" b="0"/>
+        </a:fillRef>
+        <a:effectRef idx="0">
+          <a:scrgbClr r="0" g="0" b="0"/>
+        </a:effectRef>
+        <a:fontRef idx="minor">
+          <a:schemeClr val="lt1"/>
+        </a:fontRef>
+      </dsp:style>
+      <dsp:txBody>
+        <a:bodyPr spcFirstLastPara="0" vert="horz" wrap="square" lIns="13970" tIns="13970" rIns="13970" bIns="13970" numCol="1" spcCol="1270" anchor="ctr" anchorCtr="0">
+          <a:noAutofit/>
+        </a:bodyPr>
+        <a:lstStyle/>
+        <a:p>
+          <a:pPr marL="0" lvl="0" indent="0" algn="ctr" defTabSz="488950">
+            <a:lnSpc>
+              <a:spcPct val="90000"/>
+            </a:lnSpc>
+            <a:spcBef>
+              <a:spcPct val="0"/>
+            </a:spcBef>
+            <a:spcAft>
+              <a:spcPct val="35000"/>
+            </a:spcAft>
+            <a:buNone/>
+          </a:pPr>
+          <a:endParaRPr lang="en-US" sz="1100" kern="1200"/>
+        </a:p>
+      </dsp:txBody>
+      <dsp:txXfrm>
+        <a:off x="1323390" y="1903049"/>
+        <a:ext cx="808939" cy="808939"/>
+      </dsp:txXfrm>
+    </dsp:sp>
+  </dsp:spTree>
+</dsp:drawing>
+</file>
+
+<file path=ppt/diagrams/layout1.xml><?xml version="1.0" encoding="utf-8"?>
+<dgm:layoutDef xmlns:dgm="http://schemas.openxmlformats.org/drawingml/2006/diagram" xmlns:a="http://schemas.openxmlformats.org/drawingml/2006/main" uniqueId="urn:microsoft.com/office/officeart/2005/8/layout/radial6">
+  <dgm:title val=""/>
+  <dgm:desc val=""/>
+  <dgm:catLst>
+    <dgm:cat type="cycle" pri="9000"/>
+    <dgm:cat type="relationship" pri="21000"/>
+  </dgm:catLst>
+  <dgm:sampData>
+    <dgm:dataModel>
+      <dgm:ptLst>
+        <dgm:pt modelId="0" type="doc"/>
+        <dgm:pt modelId="1">
+          <dgm:prSet phldr="1"/>
+        </dgm:pt>
+        <dgm:pt modelId="11">
+          <dgm:prSet phldr="1"/>
+        </dgm:pt>
+        <dgm:pt modelId="12">
+          <dgm:prSet phldr="1"/>
+        </dgm:pt>
+        <dgm:pt modelId="13">
+          <dgm:prSet phldr="1"/>
+        </dgm:pt>
+        <dgm:pt modelId="14">
+          <dgm:prSet phldr="1"/>
+        </dgm:pt>
+      </dgm:ptLst>
+      <dgm:cxnLst>
+        <dgm:cxn modelId="2" srcId="0" destId="1" srcOrd="0" destOrd="0"/>
+        <dgm:cxn modelId="3" srcId="1" destId="11" srcOrd="0" destOrd="0"/>
+        <dgm:cxn modelId="4" srcId="1" destId="12" srcOrd="1" destOrd="0"/>
+        <dgm:cxn modelId="5" srcId="1" destId="13" srcOrd="2" destOrd="0"/>
+        <dgm:cxn modelId="6" srcId="1" destId="14" srcOrd="3" destOrd="0"/>
+      </dgm:cxnLst>
+      <dgm:bg/>
+      <dgm:whole/>
+    </dgm:dataModel>
+  </dgm:sampData>
+  <dgm:styleData>
+    <dgm:dataModel>
+      <dgm:ptLst>
+        <dgm:pt modelId="0" type="doc"/>
+        <dgm:pt modelId="1"/>
+        <dgm:pt modelId="11"/>
+        <dgm:pt modelId="12"/>
+        <dgm:pt modelId="13"/>
+      </dgm:ptLst>
+      <dgm:cxnLst>
+        <dgm:cxn modelId="2" srcId="0" destId="1" srcOrd="0" destOrd="0"/>
+        <dgm:cxn modelId="15" srcId="1" destId="11" srcOrd="0" destOrd="0"/>
+        <dgm:cxn modelId="16" srcId="1" destId="12" srcOrd="1" destOrd="0"/>
+        <dgm:cxn modelId="17" srcId="1" destId="13" srcOrd="2" destOrd="0"/>
+      </dgm:cxnLst>
+      <dgm:bg/>
+      <dgm:whole/>
+    </dgm:dataModel>
+  </dgm:styleData>
+  <dgm:clrData>
+    <dgm:dataModel>
+      <dgm:ptLst>
+        <dgm:pt modelId="0" type="doc"/>
+        <dgm:pt modelId="1"/>
+        <dgm:pt modelId="11"/>
+        <dgm:pt modelId="12"/>
+        <dgm:pt modelId="13"/>
+        <dgm:pt modelId="14"/>
+        <dgm:pt modelId="15"/>
+        <dgm:pt modelId="16"/>
+      </dgm:ptLst>
+      <dgm:cxnLst>
+        <dgm:cxn modelId="2" srcId="0" destId="1" srcOrd="0" destOrd="0"/>
+        <dgm:cxn modelId="16" srcId="1" destId="11" srcOrd="0" destOrd="0"/>
+        <dgm:cxn modelId="17" srcId="1" destId="12" srcOrd="1" destOrd="0"/>
+        <dgm:cxn modelId="18" srcId="1" destId="13" srcOrd="2" destOrd="0"/>
+        <dgm:cxn modelId="19" srcId="1" destId="14" srcOrd="3" destOrd="0"/>
+        <dgm:cxn modelId="20" srcId="1" destId="15" srcOrd="4" destOrd="0"/>
+        <dgm:cxn modelId="21" srcId="1" destId="16" srcOrd="5" destOrd="0"/>
+      </dgm:cxnLst>
+      <dgm:bg/>
+      <dgm:whole/>
+    </dgm:dataModel>
+  </dgm:clrData>
+  <dgm:layoutNode name="Name0">
+    <dgm:varLst>
+      <dgm:chMax val="1"/>
+      <dgm:dir/>
+      <dgm:animLvl val="ctr"/>
+      <dgm:resizeHandles val="exact"/>
+    </dgm:varLst>
+    <dgm:choose name="Name1">
+      <dgm:if name="Name2" func="var" arg="dir" op="equ" val="norm">
+        <dgm:choose name="Name3">
+          <dgm:if name="Name4" axis="ch ch" ptType="node node" st="1 1" cnt="1 0" func="cnt" op="lte" val="1">
+            <dgm:alg type="cycle">
+              <dgm:param type="stAng" val="90"/>
+              <dgm:param type="spanAng" val="360"/>
+              <dgm:param type="ctrShpMap" val="fNode"/>
+            </dgm:alg>
+          </dgm:if>
+          <dgm:else name="Name5">
+            <dgm:alg type="cycle">
+              <dgm:param type="stAng" val="0"/>
+              <dgm:param type="spanAng" val="360"/>
+              <dgm:param type="ctrShpMap" val="fNode"/>
+            </dgm:alg>
+          </dgm:else>
+        </dgm:choose>
+      </dgm:if>
+      <dgm:else name="Name6">
+        <dgm:choose name="Name7">
+          <dgm:if name="Name8" axis="ch ch" ptType="node node" st="1 1" cnt="1 0" func="cnt" op="lte" val="1">
+            <dgm:alg type="cycle">
+              <dgm:param type="stAng" val="-90"/>
+              <dgm:param type="spanAng" val="360"/>
+              <dgm:param type="ctrShpMap" val="fNode"/>
+            </dgm:alg>
+          </dgm:if>
+          <dgm:else name="Name9">
+            <dgm:alg type="cycle">
+              <dgm:param type="stAng" val="0"/>
+              <dgm:param type="spanAng" val="-360"/>
+              <dgm:param type="ctrShpMap" val="fNode"/>
+            </dgm:alg>
+          </dgm:else>
+        </dgm:choose>
+      </dgm:else>
+    </dgm:choose>
+    <dgm:shape xmlns:r="http://schemas.openxmlformats.org/officeDocument/2006/relationships" r:blip="">
+      <dgm:adjLst/>
+    </dgm:shape>
+    <dgm:presOf/>
+    <dgm:choose name="Name10">
+      <dgm:if name="Name11" func="var" arg="dir" op="equ" val="norm">
+        <dgm:choose name="Name12">
+          <dgm:if name="Name13" axis="ch ch" ptType="node node" st="1 1" cnt="1 0" func="cnt" op="equ" val="1">
+            <dgm:constrLst>
+              <dgm:constr type="diam" val="170"/>
+              <dgm:constr type="w" for="ch" forName="centerShape" refType="w"/>
+              <dgm:constr type="w" for="ch" forName="oneComp" refType="w" refFor="ch" refForName="centerShape" op="equ" fact="0.7"/>
+              <dgm:constr type="sp" refType="w" refFor="ch" refForName="oneComp" fact="0.3"/>
+              <dgm:constr type="sibSp" refType="w" refFor="ch" refForName="oneComp" fact="0.3"/>
+              <dgm:constr type="primFontSz" for="ch" forName="centerShape" val="65"/>
+              <dgm:constr type="primFontSz" for="des" forName="oneNode" refType="primFontSz" refFor="ch" refForName="centerShape" fact="0.95"/>
+              <dgm:constr type="primFontSz" for="des" forName="oneNode" refType="primFontSz" refFor="ch" refForName="centerShape" op="lte" fact="0.95"/>
+              <dgm:constr type="diam" for="ch" forName="singleconn" refType="diam" op="equ" fact="-1"/>
+              <dgm:constr type="h" for="ch" forName="singleconn" refType="w" refFor="ch" refForName="oneComp" fact="0.24"/>
+              <dgm:constr type="w" for="ch" forName="dummya" refType="w" refFor="ch" refForName="oneComp" op="equ"/>
+              <dgm:constr type="w" for="ch" forName="dummyb" refType="w" refFor="ch" refForName="oneComp" op="equ"/>
+              <dgm:constr type="w" for="ch" forName="dummyc" refType="w" refFor="ch" refForName="oneComp" op="equ"/>
+            </dgm:constrLst>
+          </dgm:if>
+          <dgm:else name="Name14">
+            <dgm:constrLst>
+              <dgm:constr type="diam" val="170"/>
+              <dgm:constr type="w" for="ch" forName="centerShape" refType="w"/>
+              <dgm:constr type="w" for="ch" forName="node" refType="w" refFor="ch" refForName="centerShape" op="equ" fact="0.7"/>
+              <dgm:constr type="sp" refType="w" refFor="ch" refForName="node" fact="0.3"/>
+              <dgm:constr type="sibSp" refType="w" refFor="ch" refForName="node" fact="0.3"/>
+              <dgm:constr type="primFontSz" for="ch" forName="centerShape" val="65"/>
+              <dgm:constr type="primFontSz" for="des" forName="node" refType="primFontSz" refFor="ch" refForName="centerShape" fact="0.78"/>
+              <dgm:constr type="primFontSz" for="ch" forName="node" refType="primFontSz" refFor="ch" refForName="centerShape" op="lte" fact="0.95"/>
+              <dgm:constr type="diam" for="ch" forName="sibTrans" refType="diam" op="equ"/>
+              <dgm:constr type="h" for="ch" forName="sibTrans" refType="w" refFor="ch" refForName="node" fact="0.24"/>
+              <dgm:constr type="w" for="ch" forName="dummy" val="1"/>
+            </dgm:constrLst>
+          </dgm:else>
+        </dgm:choose>
+      </dgm:if>
+      <dgm:else name="Name15">
+        <dgm:choose name="Name16">
+          <dgm:if name="Name17" axis="ch ch" ptType="node node" st="1 1" cnt="1 0" func="cnt" op="equ" val="1">
+            <dgm:constrLst>
+              <dgm:constr type="diam" val="170"/>
+              <dgm:constr type="w" for="ch" forName="centerShape" refType="w"/>
+              <dgm:constr type="w" for="ch" forName="oneComp" refType="w" refFor="ch" refForName="centerShape" op="equ" fact="0.7"/>
+              <dgm:constr type="sp" refType="w" refFor="ch" refForName="oneComp" fact="0.3"/>
+              <dgm:constr type="sibSp" refType="w" refFor="ch" refForName="oneComp" fact="0.3"/>
+              <dgm:constr type="primFontSz" for="ch" forName="centerShape" val="65"/>
+              <dgm:constr type="primFontSz" for="des" forName="oneNode" refType="primFontSz" refFor="ch" refForName="centerShape" fact="0.95"/>
+              <dgm:constr type="primFontSz" for="ch" forName="oneNode" refType="primFontSz" refFor="ch" refForName="centerShape" op="lte" fact="0.95"/>
+              <dgm:constr type="diam" for="ch" forName="singleconn" refType="diam"/>
+              <dgm:constr type="h" for="ch" forName="singleconn" refType="w" refFor="ch" refForName="oneComp" fact="0.24"/>
+              <dgm:constr type="diam" for="ch" refType="diam" op="equ"/>
+              <dgm:constr type="w" for="ch" forName="dummya" refType="w" refFor="ch" refForName="oneComp" op="equ"/>
+              <dgm:constr type="w" for="ch" forName="dummyb" refType="w" refFor="ch" refForName="oneComp" op="equ"/>
+              <dgm:constr type="w" for="ch" forName="dummyc" refType="w" refFor="ch" refForName="oneComp" op="equ"/>
+            </dgm:constrLst>
+          </dgm:if>
+          <dgm:else name="Name18">
+            <dgm:constrLst>
+              <dgm:constr type="diam" val="170"/>
+              <dgm:constr type="w" for="ch" forName="centerShape" refType="w"/>
+              <dgm:constr type="w" for="ch" forName="node" refType="w" refFor="ch" refForName="centerShape" op="equ" fact="0.7"/>
+              <dgm:constr type="sp" refType="w" refFor="ch" refForName="node" fact="0.3"/>
+              <dgm:constr type="sibSp" refType="w" refFor="ch" refForName="node" fact="0.3"/>
+              <dgm:constr type="primFontSz" for="ch" forName="centerShape" val="65"/>
+              <dgm:constr type="primFontSz" for="des" forName="node" refType="primFontSz" refFor="ch" refForName="centerShape" fact="0.78"/>
+              <dgm:constr type="primFontSz" for="ch" forName="node" refType="primFontSz" refFor="ch" refForName="centerShape" op="lte" fact="0.95"/>
+              <dgm:constr type="diam" for="ch" ptType="sibTrans" refType="diam" fact="-1"/>
+              <dgm:constr type="h" for="ch" forName="sibTrans" refType="w" refFor="ch" refForName="node" fact="0.24"/>
+              <dgm:constr type="diam" for="ch" refType="diam" op="equ" fact="-1"/>
+              <dgm:constr type="w" for="ch" forName="dummy" val="1"/>
+            </dgm:constrLst>
+          </dgm:else>
+        </dgm:choose>
+      </dgm:else>
+    </dgm:choose>
+    <dgm:ruleLst>
+      <dgm:rule type="diam" val="INF" fact="NaN" max="NaN"/>
+    </dgm:ruleLst>
+    <dgm:forEach name="Name19" axis="ch" ptType="node" cnt="1">
+      <dgm:layoutNode name="centerShape" styleLbl="node0">
+        <dgm:alg type="tx"/>
+        <dgm:shape xmlns:r="http://schemas.openxmlformats.org/officeDocument/2006/relationships" type="ellipse" r:blip="">
+          <dgm:adjLst/>
+        </dgm:shape>
+        <dgm:presOf axis="self"/>
+        <dgm:constrLst>
+          <dgm:constr type="h" refType="w"/>
+          <dgm:constr type="tMarg" refType="primFontSz" fact="0.1"/>
+          <dgm:constr type="bMarg" refType="primFontSz" fact="0.1"/>
+          <dgm:constr type="lMarg" refType="primFontSz" fact="0.1"/>
+          <dgm:constr type="rMarg" refType="primFontSz" fact="0.1"/>
+        </dgm:constrLst>
+        <dgm:ruleLst>
+          <dgm:rule type="primFontSz" val="5" fact="NaN" max="NaN"/>
+        </dgm:ruleLst>
+      </dgm:layoutNode>
+      <dgm:forEach name="Name20" axis="ch">
+        <dgm:forEach name="Name21" axis="self" ptType="node">
+          <dgm:choose name="Name22">
+            <dgm:if name="Name23" axis="par ch" ptType="node node" func="cnt" op="gt" val="1">
+              <dgm:layoutNode name="node" styleLbl="node1">
+                <dgm:varLst>
+                  <dgm:bulletEnabled val="1"/>
+                </dgm:varLst>
+                <dgm:alg type="tx">
+                  <dgm:param type="txAnchorVertCh" val="mid"/>
+                </dgm:alg>
+                <dgm:shape xmlns:r="http://schemas.openxmlformats.org/officeDocument/2006/relationships" type="ellipse" r:blip="">
+                  <dgm:adjLst/>
+                </dgm:shape>
+                <dgm:presOf axis="desOrSelf" ptType="node"/>
+                <dgm:constrLst>
+                  <dgm:constr type="h" refType="w"/>
+                  <dgm:constr type="tMarg" refType="primFontSz" fact="0.1"/>
+                  <dgm:constr type="bMarg" refType="primFontSz" fact="0.1"/>
+                  <dgm:constr type="lMarg" refType="primFontSz" fact="0.1"/>
+                  <dgm:constr type="rMarg" refType="primFontSz" fact="0.1"/>
+                </dgm:constrLst>
+                <dgm:ruleLst>
+                  <dgm:rule type="primFontSz" val="5" fact="NaN" max="NaN"/>
+                </dgm:ruleLst>
+              </dgm:layoutNode>
+              <dgm:layoutNode name="dummy">
+                <dgm:alg type="sp"/>
+                <dgm:shape xmlns:r="http://schemas.openxmlformats.org/officeDocument/2006/relationships" r:blip="">
+                  <dgm:adjLst/>
+                </dgm:shape>
+                <dgm:presOf/>
+                <dgm:constrLst>
+                  <dgm:constr type="h" refType="w"/>
+                </dgm:constrLst>
+                <dgm:ruleLst/>
+              </dgm:layoutNode>
+              <dgm:forEach name="sibTransForEach" axis="followSib" ptType="sibTrans" hideLastTrans="0" cnt="1">
+                <dgm:layoutNode name="sibTrans" styleLbl="sibTrans2D1">
+                  <dgm:alg type="conn">
+                    <dgm:param type="connRout" val="curve"/>
+                    <dgm:param type="begPts" val="ctr"/>
+                    <dgm:param type="endPts" val="ctr"/>
+                    <dgm:param type="begSty" val="noArr"/>
+                    <dgm:param type="endSty" val="noArr"/>
+                    <dgm:param type="dstNode" val="node"/>
+                  </dgm:alg>
+                  <dgm:shape xmlns:r="http://schemas.openxmlformats.org/officeDocument/2006/relationships" type="conn" r:blip="" zOrderOff="-999">
+                    <dgm:adjLst/>
+                  </dgm:shape>
+                  <dgm:presOf axis="self"/>
+                  <dgm:constrLst>
+                    <dgm:constr type="begPad"/>
+                    <dgm:constr type="endPad"/>
+                  </dgm:constrLst>
+                  <dgm:ruleLst/>
+                </dgm:layoutNode>
+              </dgm:forEach>
+            </dgm:if>
+            <dgm:if name="Name24" axis="par ch" ptType="node node" func="cnt" op="equ" val="1">
+              <dgm:layoutNode name="oneComp">
+                <dgm:alg type="composite">
+                  <dgm:param type="ar" val="1"/>
+                </dgm:alg>
+                <dgm:shape xmlns:r="http://schemas.openxmlformats.org/officeDocument/2006/relationships" r:blip="">
+                  <dgm:adjLst/>
+                </dgm:shape>
+                <dgm:presOf/>
+                <dgm:constrLst>
+                  <dgm:constr type="h" refType="w"/>
+                  <dgm:constr type="l" for="ch" forName="dummyConnPt" refType="w" fact="0.5"/>
+                  <dgm:constr type="t" for="ch" forName="dummyConnPt" refType="w" fact="0.5"/>
+                  <dgm:constr type="l" for="ch" forName="oneNode"/>
+                  <dgm:constr type="t" for="ch" forName="oneNode"/>
+                  <dgm:constr type="h" for="ch" forName="oneNode" refType="h"/>
+                  <dgm:constr type="w" for="ch" forName="oneNode" refType="w"/>
+                </dgm:constrLst>
+                <dgm:ruleLst/>
+                <dgm:layoutNode name="dummyConnPt" styleLbl="node1">
+                  <dgm:alg type="sp"/>
+                  <dgm:shape xmlns:r="http://schemas.openxmlformats.org/officeDocument/2006/relationships" r:blip="">
+                    <dgm:adjLst/>
+                  </dgm:shape>
+                  <dgm:presOf/>
+                  <dgm:constrLst>
+                    <dgm:constr type="w" val="1"/>
+                    <dgm:constr type="h" val="1"/>
+                  </dgm:constrLst>
+                  <dgm:ruleLst/>
+                </dgm:layoutNode>
+                <dgm:layoutNode name="oneNode" styleLbl="node1">
+                  <dgm:varLst>
+                    <dgm:bulletEnabled val="1"/>
+                  </dgm:varLst>
+                  <dgm:alg type="tx">
+                    <dgm:param type="txAnchorVertCh" val="mid"/>
+                  </dgm:alg>
+                  <dgm:shape xmlns:r="http://schemas.openxmlformats.org/officeDocument/2006/relationships" type="ellipse" r:blip="">
+                    <dgm:adjLst/>
+                  </dgm:shape>
+                  <dgm:presOf axis="desOrSelf" ptType="node"/>
+                  <dgm:constrLst>
+                    <dgm:constr type="h" refType="w"/>
+                    <dgm:constr type="tMarg" refType="primFontSz" fact="0.1"/>
+                    <dgm:constr type="bMarg" refType="primFontSz" fact="0.1"/>
+                    <dgm:constr type="lMarg" refType="primFontSz" fact="0.1"/>
+                    <dgm:constr type="rMarg" refType="primFontSz" fact="0.1"/>
+                  </dgm:constrLst>
+                  <dgm:ruleLst>
+                    <dgm:rule type="primFontSz" val="5" fact="NaN" max="NaN"/>
+                  </dgm:ruleLst>
+                </dgm:layoutNode>
+              </dgm:layoutNode>
+              <dgm:layoutNode name="dummya">
+                <dgm:alg type="sp"/>
+                <dgm:shape xmlns:r="http://schemas.openxmlformats.org/officeDocument/2006/relationships" r:blip="">
+                  <dgm:adjLst/>
+                </dgm:shape>
+                <dgm:presOf/>
+                <dgm:constrLst>
+                  <dgm:constr type="h" refType="w"/>
+                </dgm:constrLst>
+                <dgm:ruleLst/>
+              </dgm:layoutNode>
+              <dgm:layoutNode name="dummyb">
+                <dgm:alg type="sp"/>
+                <dgm:shape xmlns:r="http://schemas.openxmlformats.org/officeDocument/2006/relationships" r:blip="">
+                  <dgm:adjLst/>
+                </dgm:shape>
+                <dgm:presOf/>
+                <dgm:constrLst>
+                  <dgm:constr type="h" refType="w"/>
+                </dgm:constrLst>
+                <dgm:ruleLst/>
+              </dgm:layoutNode>
+              <dgm:layoutNode name="dummyc">
+                <dgm:alg type="sp"/>
+                <dgm:shape xmlns:r="http://schemas.openxmlformats.org/officeDocument/2006/relationships" r:blip="">
+                  <dgm:adjLst/>
+                </dgm:shape>
+                <dgm:presOf/>
+                <dgm:constrLst>
+                  <dgm:constr type="h" refType="w"/>
+                </dgm:constrLst>
+                <dgm:ruleLst/>
+              </dgm:layoutNode>
+              <dgm:forEach name="sibTransForEach1" axis="followSib" ptType="sibTrans" hideLastTrans="0" cnt="1">
+                <dgm:layoutNode name="singleconn" styleLbl="sibTrans2D1">
+                  <dgm:alg type="conn">
+                    <dgm:param type="connRout" val="longCurve"/>
+                    <dgm:param type="begPts" val="bCtr"/>
+                    <dgm:param type="endPts" val="tCtr"/>
+                    <dgm:param type="begSty" val="noArr"/>
+                    <dgm:param type="endSty" val="noArr"/>
+                    <dgm:param type="srcNode" val="dummyConnPt"/>
+                    <dgm:param type="dstNode" val="dummyConnPt"/>
+                  </dgm:alg>
+                  <dgm:shape xmlns:r="http://schemas.openxmlformats.org/officeDocument/2006/relationships" type="conn" r:blip="" zOrderOff="-999">
+                    <dgm:adjLst/>
+                  </dgm:shape>
+                  <dgm:presOf axis="self"/>
+                  <dgm:constrLst>
+                    <dgm:constr type="begPad"/>
+                    <dgm:constr type="endPad"/>
+                  </dgm:constrLst>
+                  <dgm:ruleLst/>
+                </dgm:layoutNode>
+              </dgm:forEach>
+            </dgm:if>
+            <dgm:else name="Name25"/>
+          </dgm:choose>
+        </dgm:forEach>
+      </dgm:forEach>
+    </dgm:forEach>
+  </dgm:layoutNode>
+</dgm:layoutDef>
+</file>
+
+<file path=ppt/diagrams/quickStyle1.xml><?xml version="1.0" encoding="utf-8"?>
+<dgm:styleDef xmlns:dgm="http://schemas.openxmlformats.org/drawingml/2006/diagram" xmlns:a="http://schemas.openxmlformats.org/drawingml/2006/main" uniqueId="urn:microsoft.com/office/officeart/2005/8/quickstyle/simple1">
+  <dgm:title val=""/>
+  <dgm:desc val=""/>
+  <dgm:catLst>
+    <dgm:cat type="simple" pri="10100"/>
+  </dgm:catLst>
+  <dgm:scene3d>
+    <a:camera prst="orthographicFront"/>
+    <a:lightRig rig="threePt" dir="t"/>
+  </dgm:scene3d>
+  <dgm:styleLbl name="node0">
+    <dgm:scene3d>
+      <a:camera prst="orthographicFront"/>
+      <a:lightRig rig="threePt" dir="t"/>
+    </dgm:scene3d>
+    <dgm:sp3d/>
+    <dgm:txPr/>
+    <dgm:style>
+      <a:lnRef idx="2">
+        <a:scrgbClr r="0" g="0" b="0"/>
+      </a:lnRef>
+      <a:fillRef idx="1">
+        <a:scrgbClr r="0" g="0" b="0"/>
+      </a:fillRef>
+      <a:effectRef idx="0">
+        <a:scrgbClr r="0" g="0" b="0"/>
+      </a:effectRef>
+      <a:fontRef idx="minor">
+        <a:schemeClr val="lt1"/>
+      </a:fontRef>
+    </dgm:style>
+  </dgm:styleLbl>
+  <dgm:styleLbl name="lnNode1">
+    <dgm:scene3d>
+      <a:camera prst="orthographicFront"/>
+      <a:lightRig rig="threePt" dir="t"/>
+    </dgm:scene3d>
+    <dgm:sp3d/>
+    <dgm:txPr/>
+    <dgm:style>
+      <a:lnRef idx="2">
+        <a:scrgbClr r="0" g="0" b="0"/>
+      </a:lnRef>
+      <a:fillRef idx="1">
+        <a:scrgbClr r="0" g="0" b="0"/>
+      </a:fillRef>
+      <a:effectRef idx="0">
+        <a:scrgbClr r="0" g="0" b="0"/>
+      </a:effectRef>
+      <a:fontRef idx="minor">
+        <a:schemeClr val="lt1"/>
+      </a:fontRef>
+    </dgm:style>
+  </dgm:styleLbl>
+  <dgm:styleLbl name="vennNode1">
+    <dgm:scene3d>
+      <a:camera prst="orthographicFront"/>
+      <a:lightRig rig="threePt" dir="t"/>
+    </dgm:scene3d>
+    <dgm:sp3d/>
+    <dgm:txPr/>
+    <dgm:style>
+      <a:lnRef idx="2">
+        <a:scrgbClr r="0" g="0" b="0"/>
+      </a:lnRef>
+      <a:fillRef idx="1">
+        <a:scrgbClr r="0" g="0" b="0"/>
+      </a:fillRef>
+      <a:effectRef idx="0">
+        <a:scrgbClr r="0" g="0" b="0"/>
+      </a:effectRef>
+      <a:fontRef idx="minor">
+        <a:schemeClr val="tx1"/>
+      </a:fontRef>
+    </dgm:style>
+  </dgm:styleLbl>
+  <dgm:styleLbl name="alignNode1">
+    <dgm:scene3d>
+      <a:camera prst="orthographicFront"/>
+      <a:lightRig rig="threePt" dir="t"/>
+    </dgm:scene3d>
+    <dgm:sp3d/>
+    <dgm:txPr/>
+    <dgm:style>
+      <a:lnRef idx="2">
+        <a:scrgbClr r="0" g="0" b="0"/>
+      </a:lnRef>
+      <a:fillRef idx="1">
+        <a:scrgbClr r="0" g="0" b="0"/>
+      </a:fillRef>
+      <a:effectRef idx="0">
+        <a:scrgbClr r="0" g="0" b="0"/>
+      </a:effectRef>
+      <a:fontRef idx="minor">
+        <a:schemeClr val="lt1"/>
+      </a:fontRef>
+    </dgm:style>
+  </dgm:styleLbl>
+  <dgm:styleLbl name="node1">
+    <dgm:scene3d>
+      <a:camera prst="orthographicFront"/>
+      <a:lightRig rig="threePt" dir="t"/>
+    </dgm:scene3d>
+    <dgm:sp3d/>
+    <dgm:txPr/>
+    <dgm:style>
+      <a:lnRef idx="2">
+        <a:scrgbClr r="0" g="0" b="0"/>
+      </a:lnRef>
+      <a:fillRef idx="1">
+        <a:scrgbClr r="0" g="0" b="0"/>
+      </a:fillRef>
+      <a:effectRef idx="0">
+        <a:scrgbClr r="0" g="0" b="0"/>
+      </a:effectRef>
+      <a:fontRef idx="minor">
+        <a:schemeClr val="lt1"/>
+      </a:fontRef>
+    </dgm:style>
+  </dgm:styleLbl>
+  <dgm:styleLbl name="node2">
+    <dgm:scene3d>
+      <a:camera prst="orthographicFront"/>
+      <a:lightRig rig="threePt" dir="t"/>
+    </dgm:scene3d>
+    <dgm:sp3d/>
+    <dgm:txPr/>
+    <dgm:style>
+      <a:lnRef idx="2">
+        <a:scrgbClr r="0" g="0" b="0"/>
+      </a:lnRef>
+      <a:fillRef idx="1">
+        <a:scrgbClr r="0" g="0" b="0"/>
+      </a:fillRef>
+      <a:effectRef idx="0">
+        <a:scrgbClr r="0" g="0" b="0"/>
+      </a:effectRef>
+      <a:fontRef idx="minor">
+        <a:schemeClr val="lt1"/>
+      </a:fontRef>
+    </dgm:style>
+  </dgm:styleLbl>
+  <dgm:styleLbl name="node3">
+    <dgm:scene3d>
+      <a:camera prst="orthographicFront"/>
+      <a:lightRig rig="threePt" dir="t"/>
+    </dgm:scene3d>
+    <dgm:sp3d/>
+    <dgm:txPr/>
+    <dgm:style>
+      <a:lnRef idx="2">
+        <a:scrgbClr r="0" g="0" b="0"/>
+      </a:lnRef>
+      <a:fillRef idx="1">
+        <a:scrgbClr r="0" g="0" b="0"/>
+      </a:fillRef>
+      <a:effectRef idx="0">
+        <a:scrgbClr r="0" g="0" b="0"/>
+      </a:effectRef>
+      <a:fontRef idx="minor">
+        <a:schemeClr val="lt1"/>
+      </a:fontRef>
+    </dgm:style>
+  </dgm:styleLbl>
+  <dgm:styleLbl name="node4">
+    <dgm:scene3d>
+      <a:camera prst="orthographicFront"/>
+      <a:lightRig rig="threePt" dir="t"/>
+    </dgm:scene3d>
+    <dgm:sp3d/>
+    <dgm:txPr/>
+    <dgm:style>
+      <a:lnRef idx="2">
+        <a:scrgbClr r="0" g="0" b="0"/>
+      </a:lnRef>
+      <a:fillRef idx="1">
+        <a:scrgbClr r="0" g="0" b="0"/>
+      </a:fillRef>
+      <a:effectRef idx="0">
+        <a:scrgbClr r="0" g="0" b="0"/>
+      </a:effectRef>
+      <a:fontRef idx="minor">
+        <a:schemeClr val="lt1"/>
+      </a:fontRef>
+    </dgm:style>
+  </dgm:styleLbl>
+  <dgm:styleLbl name="fgImgPlace1">
+    <dgm:scene3d>
+      <a:camera prst="orthographicFront"/>
+      <a:lightRig rig="threePt" dir="t"/>
+    </dgm:scene3d>
+    <dgm:sp3d/>
+    <dgm:txPr/>
+    <dgm:style>
+      <a:lnRef idx="2">
+        <a:scrgbClr r="0" g="0" b="0"/>
+      </a:lnRef>
+      <a:fillRef idx="1">
+        <a:scrgbClr r="0" g="0" b="0"/>
+      </a:fillRef>
+      <a:effectRef idx="0">
+        <a:scrgbClr r="0" g="0" b="0"/>
+      </a:effectRef>
+      <a:fontRef idx="minor"/>
+    </dgm:style>
+  </dgm:styleLbl>
+  <dgm:styleLbl name="alignImgPlace1">
+    <dgm:scene3d>
+      <a:camera prst="orthographicFront"/>
+      <a:lightRig rig="threePt" dir="t"/>
+    </dgm:scene3d>
+    <dgm:sp3d/>
+    <dgm:txPr/>
+    <dgm:style>
+      <a:lnRef idx="2">
+        <a:scrgbClr r="0" g="0" b="0"/>
+      </a:lnRef>
+      <a:fillRef idx="1">
+        <a:scrgbClr r="0" g="0" b="0"/>
+      </a:fillRef>
+      <a:effectRef idx="0">
+        <a:scrgbClr r="0" g="0" b="0"/>
+      </a:effectRef>
+      <a:fontRef idx="minor"/>
+    </dgm:style>
+  </dgm:styleLbl>
+  <dgm:styleLbl name="bgImgPlace1">
+    <dgm:scene3d>
+      <a:camera prst="orthographicFront"/>
+      <a:lightRig rig="threePt" dir="t"/>
+    </dgm:scene3d>
+    <dgm:sp3d/>
+    <dgm:txPr/>
+    <dgm:style>
+      <a:lnRef idx="2">
+        <a:scrgbClr r="0" g="0" b="0"/>
+      </a:lnRef>
+      <a:fillRef idx="1">
+        <a:scrgbClr r="0" g="0" b="0"/>
+      </a:fillRef>
+      <a:effectRef idx="0">
+        <a:scrgbClr r="0" g="0" b="0"/>
+      </a:effectRef>
+      <a:fontRef idx="minor"/>
+    </dgm:style>
+  </dgm:styleLbl>
+  <dgm:styleLbl name="sibTrans2D1">
+    <dgm:scene3d>
+      <a:camera prst="orthographicFront"/>
+      <a:lightRig rig="threePt" dir="t"/>
+    </dgm:scene3d>
+    <dgm:sp3d/>
+    <dgm:txPr/>
+    <dgm:style>
+      <a:lnRef idx="0">
+        <a:scrgbClr r="0" g="0" b="0"/>
+      </a:lnRef>
+      <a:fillRef idx="1">
+        <a:scrgbClr r="0" g="0" b="0"/>
+      </a:fillRef>
+      <a:effectRef idx="0">
+        <a:scrgbClr r="0" g="0" b="0"/>
+      </a:effectRef>
+      <a:fontRef idx="minor">
+        <a:schemeClr val="lt1"/>
+      </a:fontRef>
+    </dgm:style>
+  </dgm:styleLbl>
+  <dgm:styleLbl name="fgSibTrans2D1">
+    <dgm:scene3d>
+      <a:camera prst="orthographicFront"/>
+      <a:lightRig rig="threePt" dir="t"/>
+    </dgm:scene3d>
+    <dgm:sp3d/>
+    <dgm:txPr/>
+    <dgm:style>
+      <a:lnRef idx="0">
+        <a:scrgbClr r="0" g="0" b="0"/>
+      </a:lnRef>
+      <a:fillRef idx="1">
+        <a:scrgbClr r="0" g="0" b="0"/>
+      </a:fillRef>
+      <a:effectRef idx="0">
+        <a:scrgbClr r="0" g="0" b="0"/>
+      </a:effectRef>
+      <a:fontRef idx="minor">
+        <a:schemeClr val="lt1"/>
+      </a:fontRef>
+    </dgm:style>
+  </dgm:styleLbl>
+  <dgm:styleLbl name="bgSibTrans2D1">
+    <dgm:scene3d>
+      <a:camera prst="orthographicFront"/>
+      <a:lightRig rig="threePt" dir="t"/>
+    </dgm:scene3d>
+    <dgm:sp3d/>
+    <dgm:txPr/>
+    <dgm:style>
+      <a:lnRef idx="0">
+        <a:scrgbClr r="0" g="0" b="0"/>
+      </a:lnRef>
+      <a:fillRef idx="1">
+        <a:scrgbClr r="0" g="0" b="0"/>
+      </a:fillRef>
+      <a:effectRef idx="0">
+        <a:scrgbClr r="0" g="0" b="0"/>
+      </a:effectRef>
+      <a:fontRef idx="minor">
+        <a:schemeClr val="lt1"/>
+      </a:fontRef>
+    </dgm:style>
+  </dgm:styleLbl>
+  <dgm:styleLbl name="sibTrans1D1">
+    <dgm:scene3d>
+      <a:camera prst="orthographicFront"/>
+      <a:lightRig rig="threePt" dir="t"/>
+    </dgm:scene3d>
+    <dgm:sp3d/>
+    <dgm:txPr/>
+    <dgm:style>
+      <a:lnRef idx="1">
+        <a:scrgbClr r="0" g="0" b="0"/>
+      </a:lnRef>
+      <a:fillRef idx="0">
+        <a:scrgbClr r="0" g="0" b="0"/>
+      </a:fillRef>
+      <a:effectRef idx="0">
+        <a:scrgbClr r="0" g="0" b="0"/>
+      </a:effectRef>
+      <a:fontRef idx="minor"/>
+    </dgm:style>
+  </dgm:styleLbl>
+  <dgm:styleLbl name="callout">
+    <dgm:scene3d>
+      <a:camera prst="orthographicFront"/>
+      <a:lightRig rig="threePt" dir="t"/>
+    </dgm:scene3d>
+    <dgm:sp3d/>
+    <dgm:txPr/>
+    <dgm:style>
+      <a:lnRef idx="2">
+        <a:scrgbClr r="0" g="0" b="0"/>
+      </a:lnRef>
+      <a:fillRef idx="1">
+        <a:scrgbClr r="0" g="0" b="0"/>
+      </a:fillRef>
+      <a:effectRef idx="0">
+        <a:scrgbClr r="0" g="0" b="0"/>
+      </a:effectRef>
+      <a:fontRef idx="minor"/>
+    </dgm:style>
+  </dgm:styleLbl>
+  <dgm:styleLbl name="asst0">
+    <dgm:scene3d>
+      <a:camera prst="orthographicFront"/>
+      <a:lightRig rig="threePt" dir="t"/>
+    </dgm:scene3d>
+    <dgm:sp3d/>
+    <dgm:txPr/>
+    <dgm:style>
+      <a:lnRef idx="2">
+        <a:scrgbClr r="0" g="0" b="0"/>
+      </a:lnRef>
+      <a:fillRef idx="1">
+        <a:scrgbClr r="0" g="0" b="0"/>
+      </a:fillRef>
+      <a:effectRef idx="0">
+        <a:scrgbClr r="0" g="0" b="0"/>
+      </a:effectRef>
+      <a:fontRef idx="minor">
+        <a:schemeClr val="lt1"/>
+      </a:fontRef>
+    </dgm:style>
+  </dgm:styleLbl>
+  <dgm:styleLbl name="asst1">
+    <dgm:scene3d>
+      <a:camera prst="orthographicFront"/>
+      <a:lightRig rig="threePt" dir="t"/>
+    </dgm:scene3d>
+    <dgm:sp3d/>
+    <dgm:txPr/>
+    <dgm:style>
+      <a:lnRef idx="2">
+        <a:scrgbClr r="0" g="0" b="0"/>
+      </a:lnRef>
+      <a:fillRef idx="1">
+        <a:scrgbClr r="0" g="0" b="0"/>
+      </a:fillRef>
+      <a:effectRef idx="0">
+        <a:scrgbClr r="0" g="0" b="0"/>
+      </a:effectRef>
+      <a:fontRef idx="minor">
+        <a:schemeClr val="lt1"/>
+      </a:fontRef>
+    </dgm:style>
+  </dgm:styleLbl>
+  <dgm:styleLbl name="asst2">
+    <dgm:scene3d>
+      <a:camera prst="orthographicFront"/>
+      <a:lightRig rig="threePt" dir="t"/>
+    </dgm:scene3d>
+    <dgm:sp3d/>
+    <dgm:txPr/>
+    <dgm:style>
+      <a:lnRef idx="2">
+        <a:scrgbClr r="0" g="0" b="0"/>
+      </a:lnRef>
+      <a:fillRef idx="1">
+        <a:scrgbClr r="0" g="0" b="0"/>
+      </a:fillRef>
+      <a:effectRef idx="0">
+        <a:scrgbClr r="0" g="0" b="0"/>
+      </a:effectRef>
+      <a:fontRef idx="minor">
+        <a:schemeClr val="lt1"/>
+      </a:fontRef>
+    </dgm:style>
+  </dgm:styleLbl>
+  <dgm:styleLbl name="asst3">
+    <dgm:scene3d>
+      <a:camera prst="orthographicFront"/>
+      <a:lightRig rig="threePt" dir="t"/>
+    </dgm:scene3d>
+    <dgm:sp3d/>
+    <dgm:txPr/>
+    <dgm:style>
+      <a:lnRef idx="2">
+        <a:scrgbClr r="0" g="0" b="0"/>
+      </a:lnRef>
+      <a:fillRef idx="1">
+        <a:scrgbClr r="0" g="0" b="0"/>
+      </a:fillRef>
+      <a:effectRef idx="0">
+        <a:scrgbClr r="0" g="0" b="0"/>
+      </a:effectRef>
+      <a:fontRef idx="minor">
+        <a:schemeClr val="lt1"/>
+      </a:fontRef>
+    </dgm:style>
+  </dgm:styleLbl>
+  <dgm:styleLbl name="asst4">
+    <dgm:scene3d>
+      <a:camera prst="orthographicFront"/>
+      <a:lightRig rig="threePt" dir="t"/>
+    </dgm:scene3d>
+    <dgm:sp3d/>
+    <dgm:txPr/>
+    <dgm:style>
+      <a:lnRef idx="2">
+        <a:scrgbClr r="0" g="0" b="0"/>
+      </a:lnRef>
+      <a:fillRef idx="1">
+        <a:scrgbClr r="0" g="0" b="0"/>
+      </a:fillRef>
+      <a:effectRef idx="0">
+        <a:scrgbClr r="0" g="0" b="0"/>
+      </a:effectRef>
+      <a:fontRef idx="minor">
+        <a:schemeClr val="lt1"/>
+      </a:fontRef>
+    </dgm:style>
+  </dgm:styleLbl>
+  <dgm:styleLbl name="parChTrans2D1">
+    <dgm:scene3d>
+      <a:camera prst="orthographicFront"/>
+      <a:lightRig rig="threePt" dir="t"/>
+    </dgm:scene3d>
+    <dgm:sp3d/>
+    <dgm:txPr/>
+    <dgm:style>
+      <a:lnRef idx="2">
+        <a:scrgbClr r="0" g="0" b="0"/>
+      </a:lnRef>
+      <a:fillRef idx="1">
+        <a:scrgbClr r="0" g="0" b="0"/>
+      </a:fillRef>
+      <a:effectRef idx="0">
+        <a:scrgbClr r="0" g="0" b="0"/>
+      </a:effectRef>
+      <a:fontRef idx="minor">
+        <a:schemeClr val="lt1"/>
+      </a:fontRef>
+    </dgm:style>
+  </dgm:styleLbl>
+  <dgm:styleLbl name="parChTrans2D2">
+    <dgm:scene3d>
+      <a:camera prst="orthographicFront"/>
+      <a:lightRig rig="threePt" dir="t"/>
+    </dgm:scene3d>
+    <dgm:sp3d/>
+    <dgm:txPr/>
+    <dgm:style>
+      <a:lnRef idx="2">
+        <a:scrgbClr r="0" g="0" b="0"/>
+      </a:lnRef>
+      <a:fillRef idx="1">
+        <a:scrgbClr r="0" g="0" b="0"/>
+      </a:fillRef>
+      <a:effectRef idx="0">
+        <a:scrgbClr r="0" g="0" b="0"/>
+      </a:effectRef>
+      <a:fontRef idx="minor">
+        <a:schemeClr val="lt1"/>
+      </a:fontRef>
+    </dgm:style>
+  </dgm:styleLbl>
+  <dgm:styleLbl name="parChTrans2D3">
+    <dgm:scene3d>
+      <a:camera prst="orthographicFront"/>
+      <a:lightRig rig="threePt" dir="t"/>
+    </dgm:scene3d>
+    <dgm:sp3d/>
+    <dgm:txPr/>
+    <dgm:style>
+      <a:lnRef idx="2">
+        <a:scrgbClr r="0" g="0" b="0"/>
+      </a:lnRef>
+      <a:fillRef idx="1">
+        <a:scrgbClr r="0" g="0" b="0"/>
+      </a:fillRef>
+      <a:effectRef idx="0">
+        <a:scrgbClr r="0" g="0" b="0"/>
+      </a:effectRef>
+      <a:fontRef idx="minor">
+        <a:schemeClr val="lt1"/>
+      </a:fontRef>
+    </dgm:style>
+  </dgm:styleLbl>
+  <dgm:styleLbl name="parChTrans2D4">
+    <dgm:scene3d>
+      <a:camera prst="orthographicFront"/>
+      <a:lightRig rig="threePt" dir="t"/>
+    </dgm:scene3d>
+    <dgm:sp3d/>
+    <dgm:txPr/>
+    <dgm:style>
+      <a:lnRef idx="2">
+        <a:scrgbClr r="0" g="0" b="0"/>
+      </a:lnRef>
+      <a:fillRef idx="1">
+        <a:scrgbClr r="0" g="0" b="0"/>
+      </a:fillRef>
+      <a:effectRef idx="0">
+        <a:scrgbClr r="0" g="0" b="0"/>
+      </a:effectRef>
+      <a:fontRef idx="minor">
+        <a:schemeClr val="lt1"/>
+      </a:fontRef>
+    </dgm:style>
+  </dgm:styleLbl>
+  <dgm:styleLbl name="parChTrans1D1">
+    <dgm:scene3d>
+      <a:camera prst="orthographicFront"/>
+      <a:lightRig rig="threePt" dir="t"/>
+    </dgm:scene3d>
+    <dgm:sp3d/>
+    <dgm:txPr/>
+    <dgm:style>
+      <a:lnRef idx="2">
+        <a:scrgbClr r="0" g="0" b="0"/>
+      </a:lnRef>
+      <a:fillRef idx="0">
+        <a:scrgbClr r="0" g="0" b="0"/>
+      </a:fillRef>
+      <a:effectRef idx="0">
+        <a:scrgbClr r="0" g="0" b="0"/>
+      </a:effectRef>
+      <a:fontRef idx="minor"/>
+    </dgm:style>
+  </dgm:styleLbl>
+  <dgm:styleLbl name="parChTrans1D2">
+    <dgm:scene3d>
+      <a:camera prst="orthographicFront"/>
+      <a:lightRig rig="threePt" dir="t"/>
+    </dgm:scene3d>
+    <dgm:sp3d/>
+    <dgm:txPr/>
+    <dgm:style>
+      <a:lnRef idx="2">
+        <a:scrgbClr r="0" g="0" b="0"/>
+      </a:lnRef>
+      <a:fillRef idx="0">
+        <a:scrgbClr r="0" g="0" b="0"/>
+      </a:fillRef>
+      <a:effectRef idx="0">
+        <a:scrgbClr r="0" g="0" b="0"/>
+      </a:effectRef>
+      <a:fontRef idx="minor"/>
+    </dgm:style>
+  </dgm:styleLbl>
+  <dgm:styleLbl name="parChTrans1D3">
+    <dgm:scene3d>
+      <a:camera prst="orthographicFront"/>
+      <a:lightRig rig="threePt" dir="t"/>
+    </dgm:scene3d>
+    <dgm:sp3d/>
+    <dgm:txPr/>
+    <dgm:style>
+      <a:lnRef idx="2">
+        <a:scrgbClr r="0" g="0" b="0"/>
+      </a:lnRef>
+      <a:fillRef idx="0">
+        <a:scrgbClr r="0" g="0" b="0"/>
+      </a:fillRef>
+      <a:effectRef idx="0">
+        <a:scrgbClr r="0" g="0" b="0"/>
+      </a:effectRef>
+      <a:fontRef idx="minor"/>
+    </dgm:style>
+  </dgm:styleLbl>
+  <dgm:styleLbl name="parChTrans1D4">
+    <dgm:scene3d>
+      <a:camera prst="orthographicFront"/>
+      <a:lightRig rig="threePt" dir="t"/>
+    </dgm:scene3d>
+    <dgm:sp3d/>
+    <dgm:txPr/>
+    <dgm:style>
+      <a:lnRef idx="2">
+        <a:scrgbClr r="0" g="0" b="0"/>
+      </a:lnRef>
+      <a:fillRef idx="0">
+        <a:scrgbClr r="0" g="0" b="0"/>
+      </a:fillRef>
+      <a:effectRef idx="0">
+        <a:scrgbClr r="0" g="0" b="0"/>
+      </a:effectRef>
+      <a:fontRef idx="minor"/>
+    </dgm:style>
+  </dgm:styleLbl>
+  <dgm:styleLbl name="fgAcc1">
+    <dgm:scene3d>
+      <a:camera prst="orthographicFront"/>
+      <a:lightRig rig="threePt" dir="t"/>
+    </dgm:scene3d>
+    <dgm:sp3d/>
+    <dgm:txPr/>
+    <dgm:style>
+      <a:lnRef idx="2">
+        <a:scrgbClr r="0" g="0" b="0"/>
+      </a:lnRef>
+      <a:fillRef idx="1">
+        <a:scrgbClr r="0" g="0" b="0"/>
+      </a:fillRef>
+      <a:effectRef idx="0">
+        <a:scrgbClr r="0" g="0" b="0"/>
+      </a:effectRef>
+      <a:fontRef idx="minor"/>
+    </dgm:style>
+  </dgm:styleLbl>
+  <dgm:styleLbl name="conFgAcc1">
+    <dgm:scene3d>
+      <a:camera prst="orthographicFront"/>
+      <a:lightRig rig="threePt" dir="t"/>
+    </dgm:scene3d>
+    <dgm:sp3d/>
+    <dgm:txPr/>
+    <dgm:style>
+      <a:lnRef idx="2">
+        <a:scrgbClr r="0" g="0" b="0"/>
+      </a:lnRef>
+      <a:fillRef idx="1">
+        <a:scrgbClr r="0" g="0" b="0"/>
+      </a:fillRef>
+      <a:effectRef idx="0">
+        <a:scrgbClr r="0" g="0" b="0"/>
+      </a:effectRef>
+      <a:fontRef idx="minor"/>
+    </dgm:style>
+  </dgm:styleLbl>
+  <dgm:styleLbl name="alignAcc1">
+    <dgm:scene3d>
+      <a:camera prst="orthographicFront"/>
+      <a:lightRig rig="threePt" dir="t"/>
+    </dgm:scene3d>
+    <dgm:sp3d/>
+    <dgm:txPr/>
+    <dgm:style>
+      <a:lnRef idx="2">
+        <a:scrgbClr r="0" g="0" b="0"/>
+      </a:lnRef>
+      <a:fillRef idx="1">
+        <a:scrgbClr r="0" g="0" b="0"/>
+      </a:fillRef>
+      <a:effectRef idx="0">
+        <a:scrgbClr r="0" g="0" b="0"/>
+      </a:effectRef>
+      <a:fontRef idx="minor"/>
+    </dgm:style>
+  </dgm:styleLbl>
+  <dgm:styleLbl name="trAlignAcc1">
+    <dgm:scene3d>
+      <a:camera prst="orthographicFront"/>
+      <a:lightRig rig="threePt" dir="t"/>
+    </dgm:scene3d>
+    <dgm:sp3d/>
+    <dgm:txPr/>
+    <dgm:style>
+      <a:lnRef idx="1">
+        <a:scrgbClr r="0" g="0" b="0"/>
+      </a:lnRef>
+      <a:fillRef idx="1">
+        <a:scrgbClr r="0" g="0" b="0"/>
+      </a:fillRef>
+      <a:effectRef idx="0">
+        <a:scrgbClr r="0" g="0" b="0"/>
+      </a:effectRef>
+      <a:fontRef idx="minor"/>
+    </dgm:style>
+  </dgm:styleLbl>
+  <dgm:styleLbl name="bgAcc1">
+    <dgm:scene3d>
+      <a:camera prst="orthographicFront"/>
+      <a:lightRig rig="threePt" dir="t"/>
+    </dgm:scene3d>
+    <dgm:sp3d/>
+    <dgm:txPr/>
+    <dgm:style>
+      <a:lnRef idx="2">
+        <a:scrgbClr r="0" g="0" b="0"/>
+      </a:lnRef>
+      <a:fillRef idx="1">
+        <a:scrgbClr r="0" g="0" b="0"/>
+      </a:fillRef>
+      <a:effectRef idx="0">
+        <a:scrgbClr r="0" g="0" b="0"/>
+      </a:effectRef>
+      <a:fontRef idx="minor"/>
+    </dgm:style>
+  </dgm:styleLbl>
+  <dgm:styleLbl name="solidFgAcc1">
+    <dgm:scene3d>
+      <a:camera prst="orthographicFront"/>
+      <a:lightRig rig="threePt" dir="t"/>
+    </dgm:scene3d>
+    <dgm:sp3d/>
+    <dgm:txPr/>
+    <dgm:style>
+      <a:lnRef idx="2">
+        <a:scrgbClr r="0" g="0" b="0"/>
+      </a:lnRef>
+      <a:fillRef idx="1">
+        <a:scrgbClr r="0" g="0" b="0"/>
+      </a:fillRef>
+      <a:effectRef idx="0">
+        <a:scrgbClr r="0" g="0" b="0"/>
+      </a:effectRef>
+      <a:fontRef idx="minor"/>
+    </dgm:style>
+  </dgm:styleLbl>
+  <dgm:styleLbl name="solidAlignAcc1">
+    <dgm:scene3d>
+      <a:camera prst="orthographicFront"/>
+      <a:lightRig rig="threePt" dir="t"/>
+    </dgm:scene3d>
+    <dgm:sp3d/>
+    <dgm:txPr/>
+    <dgm:style>
+      <a:lnRef idx="2">
+        <a:scrgbClr r="0" g="0" b="0"/>
+      </a:lnRef>
+      <a:fillRef idx="1">
+        <a:scrgbClr r="0" g="0" b="0"/>
+      </a:fillRef>
+      <a:effectRef idx="0">
+        <a:scrgbClr r="0" g="0" b="0"/>
+      </a:effectRef>
+      <a:fontRef idx="minor"/>
+    </dgm:style>
+  </dgm:styleLbl>
+  <dgm:styleLbl name="solidBgAcc1">
+    <dgm:scene3d>
+      <a:camera prst="orthographicFront"/>
+      <a:lightRig rig="threePt" dir="t"/>
+    </dgm:scene3d>
+    <dgm:sp3d/>
+    <dgm:txPr/>
+    <dgm:style>
+      <a:lnRef idx="2">
+        <a:scrgbClr r="0" g="0" b="0"/>
+      </a:lnRef>
+      <a:fillRef idx="1">
+        <a:scrgbClr r="0" g="0" b="0"/>
+      </a:fillRef>
+      <a:effectRef idx="0">
+        <a:scrgbClr r="0" g="0" b="0"/>
+      </a:effectRef>
+      <a:fontRef idx="minor"/>
+    </dgm:style>
+  </dgm:styleLbl>
+  <dgm:styleLbl name="fgAccFollowNode1">
+    <dgm:scene3d>
+      <a:camera prst="orthographicFront"/>
+      <a:lightRig rig="threePt" dir="t"/>
+    </dgm:scene3d>
+    <dgm:sp3d/>
+    <dgm:txPr/>
+    <dgm:style>
+      <a:lnRef idx="2">
+        <a:scrgbClr r="0" g="0" b="0"/>
+      </a:lnRef>
+      <a:fillRef idx="1">
+        <a:scrgbClr r="0" g="0" b="0"/>
+      </a:fillRef>
+      <a:effectRef idx="0">
+        <a:scrgbClr r="0" g="0" b="0"/>
+      </a:effectRef>
+      <a:fontRef idx="minor"/>
+    </dgm:style>
+  </dgm:styleLbl>
+  <dgm:styleLbl name="alignAccFollowNode1">
+    <dgm:scene3d>
+      <a:camera prst="orthographicFront"/>
+      <a:lightRig rig="threePt" dir="t"/>
+    </dgm:scene3d>
+    <dgm:sp3d/>
+    <dgm:txPr/>
+    <dgm:style>
+      <a:lnRef idx="2">
+        <a:scrgbClr r="0" g="0" b="0"/>
+      </a:lnRef>
+      <a:fillRef idx="1">
+        <a:scrgbClr r="0" g="0" b="0"/>
+      </a:fillRef>
+      <a:effectRef idx="0">
+        <a:scrgbClr r="0" g="0" b="0"/>
+      </a:effectRef>
+      <a:fontRef idx="minor"/>
+    </dgm:style>
+  </dgm:styleLbl>
+  <dgm:styleLbl name="bgAccFollowNode1">
+    <dgm:scene3d>
+      <a:camera prst="orthographicFront"/>
+      <a:lightRig rig="threePt" dir="t"/>
+    </dgm:scene3d>
+    <dgm:sp3d/>
+    <dgm:txPr/>
+    <dgm:style>
+      <a:lnRef idx="2">
+        <a:scrgbClr r="0" g="0" b="0"/>
+      </a:lnRef>
+      <a:fillRef idx="1">
+        <a:scrgbClr r="0" g="0" b="0"/>
+      </a:fillRef>
+      <a:effectRef idx="0">
+        <a:scrgbClr r="0" g="0" b="0"/>
+      </a:effectRef>
+      <a:fontRef idx="minor"/>
+    </dgm:style>
+  </dgm:styleLbl>
+  <dgm:styleLbl name="fgAcc0">
+    <dgm:scene3d>
+      <a:camera prst="orthographicFront"/>
+      <a:lightRig rig="threePt" dir="t"/>
+    </dgm:scene3d>
+    <dgm:sp3d/>
+    <dgm:txPr/>
+    <dgm:style>
+      <a:lnRef idx="2">
+        <a:scrgbClr r="0" g="0" b="0"/>
+      </a:lnRef>
+      <a:fillRef idx="1">
+        <a:scrgbClr r="0" g="0" b="0"/>
+      </a:fillRef>
+      <a:effectRef idx="0">
+        <a:scrgbClr r="0" g="0" b="0"/>
+      </a:effectRef>
+      <a:fontRef idx="minor"/>
+    </dgm:style>
+  </dgm:styleLbl>
+  <dgm:styleLbl name="fgAcc2">
+    <dgm:scene3d>
+      <a:camera prst="orthographicFront"/>
+      <a:lightRig rig="threePt" dir="t"/>
+    </dgm:scene3d>
+    <dgm:sp3d/>
+    <dgm:txPr/>
+    <dgm:style>
+      <a:lnRef idx="2">
+        <a:scrgbClr r="0" g="0" b="0"/>
+      </a:lnRef>
+      <a:fillRef idx="1">
+        <a:scrgbClr r="0" g="0" b="0"/>
+      </a:fillRef>
+      <a:effectRef idx="0">
+        <a:scrgbClr r="0" g="0" b="0"/>
+      </a:effectRef>
+      <a:fontRef idx="minor"/>
+    </dgm:style>
+  </dgm:styleLbl>
+  <dgm:styleLbl name="fgAcc3">
+    <dgm:scene3d>
+      <a:camera prst="orthographicFront"/>
+      <a:lightRig rig="threePt" dir="t"/>
+    </dgm:scene3d>
+    <dgm:sp3d/>
+    <dgm:txPr/>
+    <dgm:style>
+      <a:lnRef idx="2">
+        <a:scrgbClr r="0" g="0" b="0"/>
+      </a:lnRef>
+      <a:fillRef idx="1">
+        <a:scrgbClr r="0" g="0" b="0"/>
+      </a:fillRef>
+      <a:effectRef idx="0">
+        <a:scrgbClr r="0" g="0" b="0"/>
+      </a:effectRef>
+      <a:fontRef idx="minor"/>
+    </dgm:style>
+  </dgm:styleLbl>
+  <dgm:styleLbl name="fgAcc4">
+    <dgm:scene3d>
+      <a:camera prst="orthographicFront"/>
+      <a:lightRig rig="threePt" dir="t"/>
+    </dgm:scene3d>
+    <dgm:sp3d/>
+    <dgm:txPr/>
+    <dgm:style>
+      <a:lnRef idx="2">
+        <a:scrgbClr r="0" g="0" b="0"/>
+      </a:lnRef>
+      <a:fillRef idx="1">
+        <a:scrgbClr r="0" g="0" b="0"/>
+      </a:fillRef>
+      <a:effectRef idx="0">
+        <a:scrgbClr r="0" g="0" b="0"/>
+      </a:effectRef>
+      <a:fontRef idx="minor"/>
+    </dgm:style>
+  </dgm:styleLbl>
+  <dgm:styleLbl name="bgShp">
+    <dgm:scene3d>
+      <a:camera prst="orthographicFront"/>
+      <a:lightRig rig="threePt" dir="t"/>
+    </dgm:scene3d>
+    <dgm:sp3d/>
+    <dgm:txPr/>
+    <dgm:style>
+      <a:lnRef idx="0">
+        <a:scrgbClr r="0" g="0" b="0"/>
+      </a:lnRef>
+      <a:fillRef idx="1">
+        <a:scrgbClr r="0" g="0" b="0"/>
+      </a:fillRef>
+      <a:effectRef idx="0">
+        <a:scrgbClr r="0" g="0" b="0"/>
+      </a:effectRef>
+      <a:fontRef idx="minor"/>
+    </dgm:style>
+  </dgm:styleLbl>
+  <dgm:styleLbl name="dkBgShp">
+    <dgm:scene3d>
+      <a:camera prst="orthographicFront"/>
+      <a:lightRig rig="threePt" dir="t"/>
+    </dgm:scene3d>
+    <dgm:sp3d/>
+    <dgm:txPr/>
+    <dgm:style>
+      <a:lnRef idx="0">
+        <a:scrgbClr r="0" g="0" b="0"/>
+      </a:lnRef>
+      <a:fillRef idx="1">
+        <a:scrgbClr r="0" g="0" b="0"/>
+      </a:fillRef>
+      <a:effectRef idx="0">
+        <a:scrgbClr r="0" g="0" b="0"/>
+      </a:effectRef>
+      <a:fontRef idx="minor"/>
+    </dgm:style>
+  </dgm:styleLbl>
+  <dgm:styleLbl name="trBgShp">
+    <dgm:scene3d>
+      <a:camera prst="orthographicFront"/>
+      <a:lightRig rig="threePt" dir="t"/>
+    </dgm:scene3d>
+    <dgm:sp3d/>
+    <dgm:txPr/>
+    <dgm:style>
+      <a:lnRef idx="0">
+        <a:scrgbClr r="0" g="0" b="0"/>
+      </a:lnRef>
+      <a:fillRef idx="1">
+        <a:scrgbClr r="0" g="0" b="0"/>
+      </a:fillRef>
+      <a:effectRef idx="0">
+        <a:scrgbClr r="0" g="0" b="0"/>
+      </a:effectRef>
+      <a:fontRef idx="minor"/>
+    </dgm:style>
+  </dgm:styleLbl>
+  <dgm:styleLbl name="fgShp">
+    <dgm:scene3d>
+      <a:camera prst="orthographicFront"/>
+      <a:lightRig rig="threePt" dir="t"/>
+    </dgm:scene3d>
+    <dgm:sp3d/>
+    <dgm:txPr/>
+    <dgm:style>
+      <a:lnRef idx="2">
+        <a:scrgbClr r="0" g="0" b="0"/>
+      </a:lnRef>
+      <a:fillRef idx="1">
+        <a:scrgbClr r="0" g="0" b="0"/>
+      </a:fillRef>
+      <a:effectRef idx="0">
+        <a:scrgbClr r="0" g="0" b="0"/>
+      </a:effectRef>
+      <a:fontRef idx="minor"/>
+    </dgm:style>
+  </dgm:styleLbl>
+  <dgm:styleLbl name="revTx">
+    <dgm:scene3d>
+      <a:camera prst="orthographicFront"/>
+      <a:lightRig rig="threePt" dir="t"/>
+    </dgm:scene3d>
+    <dgm:sp3d/>
+    <dgm:txPr/>
+    <dgm:style>
+      <a:lnRef idx="0">
+        <a:scrgbClr r="0" g="0" b="0"/>
+      </a:lnRef>
+      <a:fillRef idx="0">
+        <a:scrgbClr r="0" g="0" b="0"/>
+      </a:fillRef>
+      <a:effectRef idx="0">
+        <a:scrgbClr r="0" g="0" b="0"/>
+      </a:effectRef>
+      <a:fontRef idx="minor"/>
+    </dgm:style>
+  </dgm:styleLbl>
+</dgm:styleDef>
+</file>
+
 <file path=ppt/notesMasters/notesMaster1.xml><?xml version="1.0" encoding="utf-8"?>
 <p:notesMaster xmlns:a="http://schemas.openxmlformats.org/drawingml/2006/main" xmlns:r="http://schemas.openxmlformats.org/officeDocument/2006/relationships" xmlns:p="http://schemas.openxmlformats.org/presentationml/2006/main">
   <p:cSld>
@@ -224,7 +3334,7 @@
             <a:fld id="{2F41DA98-DD0A-1B4F-A599-A48A0F931A5C}" type="datetimeFigureOut">
               <a:rPr lang="en-US" smtClean="0"/>
               <a:pPr/>
-              <a:t>7/31/2023</a:t>
+              <a:t>1/7/2025</a:t>
             </a:fld>
             <a:endParaRPr lang="en-US" dirty="0"/>
           </a:p>
@@ -2534,132 +5644,6 @@
           </a:p>
         </p:txBody>
       </p:sp>
-      <p:grpSp>
-        <p:nvGrpSpPr>
-          <p:cNvPr id="39" name="Group 38">
-            <a:extLst>
-              <a:ext uri="{FF2B5EF4-FFF2-40B4-BE49-F238E27FC236}">
-                <a16:creationId xmlns:a16="http://schemas.microsoft.com/office/drawing/2014/main" id="{61B988D0-9F0A-EA23-5F92-98B7CE9A9DE9}"/>
-              </a:ext>
-            </a:extLst>
-          </p:cNvPr>
-          <p:cNvGrpSpPr/>
-          <p:nvPr/>
-        </p:nvGrpSpPr>
-        <p:grpSpPr>
-          <a:xfrm>
-            <a:off x="855754" y="411452"/>
-            <a:ext cx="1949152" cy="387062"/>
-            <a:chOff x="194864" y="958528"/>
-            <a:chExt cx="1949152" cy="387062"/>
-          </a:xfrm>
-        </p:grpSpPr>
-        <p:sp>
-          <p:nvSpPr>
-            <p:cNvPr id="93" name="Rectangle 92">
-              <a:extLst>
-                <a:ext uri="{FF2B5EF4-FFF2-40B4-BE49-F238E27FC236}">
-                  <a16:creationId xmlns:a16="http://schemas.microsoft.com/office/drawing/2014/main" id="{B4926EA7-34B2-0E1E-1E49-D4D8DA8BE85D}"/>
-                </a:ext>
-              </a:extLst>
-            </p:cNvPr>
-            <p:cNvSpPr/>
-            <p:nvPr/>
-          </p:nvSpPr>
-          <p:spPr>
-            <a:xfrm>
-              <a:off x="194864" y="958528"/>
-              <a:ext cx="1949152" cy="387062"/>
-            </a:xfrm>
-            <a:prstGeom prst="rect">
-              <a:avLst/>
-            </a:prstGeom>
-            <a:solidFill>
-              <a:schemeClr val="accent1">
-                <a:alpha val="50000"/>
-              </a:schemeClr>
-            </a:solidFill>
-            <a:effectLst>
-              <a:outerShdw blurRad="50800" dist="38100" dir="2700000" algn="tl" rotWithShape="0">
-                <a:prstClr val="black">
-                  <a:alpha val="40000"/>
-                </a:prstClr>
-              </a:outerShdw>
-            </a:effectLst>
-          </p:spPr>
-          <p:style>
-            <a:lnRef idx="2">
-              <a:schemeClr val="accent1">
-                <a:shade val="15000"/>
-              </a:schemeClr>
-            </a:lnRef>
-            <a:fillRef idx="1">
-              <a:schemeClr val="accent1"/>
-            </a:fillRef>
-            <a:effectRef idx="0">
-              <a:schemeClr val="accent1"/>
-            </a:effectRef>
-            <a:fontRef idx="minor">
-              <a:schemeClr val="lt1"/>
-            </a:fontRef>
-          </p:style>
-          <p:txBody>
-            <a:bodyPr rtlCol="0" anchor="ctr"/>
-            <a:lstStyle/>
-            <a:p>
-              <a:pPr algn="ctr"/>
-              <a:endParaRPr lang="en-US" sz="1534"/>
-            </a:p>
-          </p:txBody>
-        </p:sp>
-        <p:sp>
-          <p:nvSpPr>
-            <p:cNvPr id="94" name="TextBox 93">
-              <a:extLst>
-                <a:ext uri="{FF2B5EF4-FFF2-40B4-BE49-F238E27FC236}">
-                  <a16:creationId xmlns:a16="http://schemas.microsoft.com/office/drawing/2014/main" id="{239814A4-BB06-C075-54C9-770385EBE7E4}"/>
-                </a:ext>
-              </a:extLst>
-            </p:cNvPr>
-            <p:cNvSpPr txBox="1"/>
-            <p:nvPr/>
-          </p:nvSpPr>
-          <p:spPr>
-            <a:xfrm>
-              <a:off x="194864" y="1021586"/>
-              <a:ext cx="1949152" cy="262059"/>
-            </a:xfrm>
-            <a:prstGeom prst="rect">
-              <a:avLst/>
-            </a:prstGeom>
-            <a:noFill/>
-          </p:spPr>
-          <p:txBody>
-            <a:bodyPr wrap="square" lIns="0" tIns="0" rIns="0" bIns="0" rtlCol="0">
-              <a:spAutoFit/>
-            </a:bodyPr>
-            <a:lstStyle/>
-            <a:p>
-              <a:pPr algn="ctr"/>
-              <a:r>
-                <a:rPr lang="en-US" sz="1703" b="1" dirty="0">
-                  <a:solidFill>
-                    <a:schemeClr val="bg2"/>
-                  </a:solidFill>
-                  <a:cs typeface="Calibri" panose="020F0502020204030204" pitchFamily="34" charset="0"/>
-                </a:rPr>
-                <a:t>Referral - Push</a:t>
-              </a:r>
-              <a:endParaRPr lang="en-US" sz="1363" b="1" dirty="0">
-                <a:solidFill>
-                  <a:schemeClr val="bg2"/>
-                </a:solidFill>
-                <a:cs typeface="Calibri" panose="020F0502020204030204" pitchFamily="34" charset="0"/>
-              </a:endParaRPr>
-            </a:p>
-          </p:txBody>
-        </p:sp>
-      </p:grpSp>
       <p:sp>
         <p:nvSpPr>
           <p:cNvPr id="63" name="TextBox 62">
@@ -6132,132 +9116,6 @@
           </a:fontRef>
         </p:style>
       </p:cxnSp>
-      <p:grpSp>
-        <p:nvGrpSpPr>
-          <p:cNvPr id="55" name="Group 54">
-            <a:extLst>
-              <a:ext uri="{FF2B5EF4-FFF2-40B4-BE49-F238E27FC236}">
-                <a16:creationId xmlns:a16="http://schemas.microsoft.com/office/drawing/2014/main" id="{AF2239E8-D4FD-7237-8CF1-FB56032634B2}"/>
-              </a:ext>
-            </a:extLst>
-          </p:cNvPr>
-          <p:cNvGrpSpPr/>
-          <p:nvPr/>
-        </p:nvGrpSpPr>
-        <p:grpSpPr>
-          <a:xfrm>
-            <a:off x="637890" y="364342"/>
-            <a:ext cx="2943380" cy="387062"/>
-            <a:chOff x="194865" y="958528"/>
-            <a:chExt cx="2943380" cy="387062"/>
-          </a:xfrm>
-        </p:grpSpPr>
-        <p:sp>
-          <p:nvSpPr>
-            <p:cNvPr id="8" name="Rectangle 7">
-              <a:extLst>
-                <a:ext uri="{FF2B5EF4-FFF2-40B4-BE49-F238E27FC236}">
-                  <a16:creationId xmlns:a16="http://schemas.microsoft.com/office/drawing/2014/main" id="{2277FB95-7FFB-EC7E-E6C7-1FA53AE7B8C3}"/>
-                </a:ext>
-              </a:extLst>
-            </p:cNvPr>
-            <p:cNvSpPr/>
-            <p:nvPr/>
-          </p:nvSpPr>
-          <p:spPr>
-            <a:xfrm>
-              <a:off x="194869" y="958528"/>
-              <a:ext cx="2799310" cy="387062"/>
-            </a:xfrm>
-            <a:prstGeom prst="rect">
-              <a:avLst/>
-            </a:prstGeom>
-            <a:solidFill>
-              <a:schemeClr val="accent1">
-                <a:alpha val="50000"/>
-              </a:schemeClr>
-            </a:solidFill>
-            <a:effectLst>
-              <a:outerShdw blurRad="50800" dist="38100" dir="2700000" algn="tl" rotWithShape="0">
-                <a:prstClr val="black">
-                  <a:alpha val="40000"/>
-                </a:prstClr>
-              </a:outerShdw>
-            </a:effectLst>
-          </p:spPr>
-          <p:style>
-            <a:lnRef idx="2">
-              <a:schemeClr val="accent1">
-                <a:shade val="15000"/>
-              </a:schemeClr>
-            </a:lnRef>
-            <a:fillRef idx="1">
-              <a:schemeClr val="accent1"/>
-            </a:fillRef>
-            <a:effectRef idx="0">
-              <a:schemeClr val="accent1"/>
-            </a:effectRef>
-            <a:fontRef idx="minor">
-              <a:schemeClr val="lt1"/>
-            </a:fontRef>
-          </p:style>
-          <p:txBody>
-            <a:bodyPr rtlCol="0" anchor="ctr"/>
-            <a:lstStyle/>
-            <a:p>
-              <a:pPr algn="ctr"/>
-              <a:endParaRPr lang="en-US" sz="1534"/>
-            </a:p>
-          </p:txBody>
-        </p:sp>
-        <p:sp>
-          <p:nvSpPr>
-            <p:cNvPr id="12" name="TextBox 11">
-              <a:extLst>
-                <a:ext uri="{FF2B5EF4-FFF2-40B4-BE49-F238E27FC236}">
-                  <a16:creationId xmlns:a16="http://schemas.microsoft.com/office/drawing/2014/main" id="{B8ABC071-E4EB-0626-751C-20179457F090}"/>
-                </a:ext>
-              </a:extLst>
-            </p:cNvPr>
-            <p:cNvSpPr txBox="1"/>
-            <p:nvPr/>
-          </p:nvSpPr>
-          <p:spPr>
-            <a:xfrm>
-              <a:off x="194865" y="1021586"/>
-              <a:ext cx="2943380" cy="262059"/>
-            </a:xfrm>
-            <a:prstGeom prst="rect">
-              <a:avLst/>
-            </a:prstGeom>
-            <a:noFill/>
-          </p:spPr>
-          <p:txBody>
-            <a:bodyPr wrap="square" lIns="0" tIns="0" rIns="0" bIns="0" rtlCol="0">
-              <a:spAutoFit/>
-            </a:bodyPr>
-            <a:lstStyle/>
-            <a:p>
-              <a:pPr algn="ctr"/>
-              <a:r>
-                <a:rPr lang="en-US" sz="1703" b="1" dirty="0">
-                  <a:solidFill>
-                    <a:schemeClr val="bg2"/>
-                  </a:solidFill>
-                  <a:cs typeface="Calibri" panose="020F0502020204030204" pitchFamily="34" charset="0"/>
-                </a:rPr>
-                <a:t>Referral - Notify and Pull</a:t>
-              </a:r>
-              <a:endParaRPr lang="en-US" sz="1363" b="1" dirty="0">
-                <a:solidFill>
-                  <a:schemeClr val="bg2"/>
-                </a:solidFill>
-                <a:cs typeface="Calibri" panose="020F0502020204030204" pitchFamily="34" charset="0"/>
-              </a:endParaRPr>
-            </a:p>
-          </p:txBody>
-        </p:sp>
-      </p:grpSp>
       <p:sp>
         <p:nvSpPr>
           <p:cNvPr id="40" name="TextBox 39">
@@ -15031,132 +17889,6 @@
           </a:p>
         </p:txBody>
       </p:sp>
-      <p:grpSp>
-        <p:nvGrpSpPr>
-          <p:cNvPr id="220" name="Group 219">
-            <a:extLst>
-              <a:ext uri="{FF2B5EF4-FFF2-40B4-BE49-F238E27FC236}">
-                <a16:creationId xmlns:a16="http://schemas.microsoft.com/office/drawing/2014/main" id="{4FDD0409-CB5A-78E9-260F-B7DC8D798A5E}"/>
-              </a:ext>
-            </a:extLst>
-          </p:cNvPr>
-          <p:cNvGrpSpPr/>
-          <p:nvPr/>
-        </p:nvGrpSpPr>
-        <p:grpSpPr>
-          <a:xfrm>
-            <a:off x="427195" y="324391"/>
-            <a:ext cx="5680528" cy="387062"/>
-            <a:chOff x="167822" y="855771"/>
-            <a:chExt cx="2943380" cy="387062"/>
-          </a:xfrm>
-        </p:grpSpPr>
-        <p:sp>
-          <p:nvSpPr>
-            <p:cNvPr id="194" name="Rectangle 193">
-              <a:extLst>
-                <a:ext uri="{FF2B5EF4-FFF2-40B4-BE49-F238E27FC236}">
-                  <a16:creationId xmlns:a16="http://schemas.microsoft.com/office/drawing/2014/main" id="{9B5DF1FE-AC5E-4EBC-F501-DB2EE4A0ED93}"/>
-                </a:ext>
-              </a:extLst>
-            </p:cNvPr>
-            <p:cNvSpPr/>
-            <p:nvPr/>
-          </p:nvSpPr>
-          <p:spPr>
-            <a:xfrm>
-              <a:off x="167827" y="855771"/>
-              <a:ext cx="2799310" cy="387062"/>
-            </a:xfrm>
-            <a:prstGeom prst="rect">
-              <a:avLst/>
-            </a:prstGeom>
-            <a:solidFill>
-              <a:schemeClr val="accent1">
-                <a:alpha val="50000"/>
-              </a:schemeClr>
-            </a:solidFill>
-            <a:effectLst>
-              <a:outerShdw blurRad="50800" dist="38100" dir="2700000" algn="tl" rotWithShape="0">
-                <a:prstClr val="black">
-                  <a:alpha val="40000"/>
-                </a:prstClr>
-              </a:outerShdw>
-            </a:effectLst>
-          </p:spPr>
-          <p:style>
-            <a:lnRef idx="2">
-              <a:schemeClr val="accent1">
-                <a:shade val="15000"/>
-              </a:schemeClr>
-            </a:lnRef>
-            <a:fillRef idx="1">
-              <a:schemeClr val="accent1"/>
-            </a:fillRef>
-            <a:effectRef idx="0">
-              <a:schemeClr val="accent1"/>
-            </a:effectRef>
-            <a:fontRef idx="minor">
-              <a:schemeClr val="lt1"/>
-            </a:fontRef>
-          </p:style>
-          <p:txBody>
-            <a:bodyPr rtlCol="0" anchor="ctr"/>
-            <a:lstStyle/>
-            <a:p>
-              <a:pPr algn="ctr"/>
-              <a:endParaRPr lang="en-US" sz="1534"/>
-            </a:p>
-          </p:txBody>
-        </p:sp>
-        <p:sp>
-          <p:nvSpPr>
-            <p:cNvPr id="195" name="TextBox 194">
-              <a:extLst>
-                <a:ext uri="{FF2B5EF4-FFF2-40B4-BE49-F238E27FC236}">
-                  <a16:creationId xmlns:a16="http://schemas.microsoft.com/office/drawing/2014/main" id="{F4954ABF-FA41-9AFE-F519-AF66F9BD0F07}"/>
-                </a:ext>
-              </a:extLst>
-            </p:cNvPr>
-            <p:cNvSpPr txBox="1"/>
-            <p:nvPr/>
-          </p:nvSpPr>
-          <p:spPr>
-            <a:xfrm>
-              <a:off x="167822" y="918829"/>
-              <a:ext cx="2943380" cy="262059"/>
-            </a:xfrm>
-            <a:prstGeom prst="rect">
-              <a:avLst/>
-            </a:prstGeom>
-            <a:noFill/>
-          </p:spPr>
-          <p:txBody>
-            <a:bodyPr wrap="square" lIns="0" tIns="0" rIns="0" bIns="0" rtlCol="0">
-              <a:spAutoFit/>
-            </a:bodyPr>
-            <a:lstStyle/>
-            <a:p>
-              <a:pPr algn="ctr"/>
-              <a:r>
-                <a:rPr lang="en-US" sz="1703" b="1" dirty="0">
-                  <a:solidFill>
-                    <a:schemeClr val="bg2"/>
-                  </a:solidFill>
-                  <a:cs typeface="Calibri" panose="020F0502020204030204" pitchFamily="34" charset="0"/>
-                </a:rPr>
-                <a:t>Referral - Notify and Pull (with intermediary)</a:t>
-              </a:r>
-              <a:endParaRPr lang="en-US" sz="1363" b="1" dirty="0">
-                <a:solidFill>
-                  <a:schemeClr val="bg2"/>
-                </a:solidFill>
-                <a:cs typeface="Calibri" panose="020F0502020204030204" pitchFamily="34" charset="0"/>
-              </a:endParaRPr>
-            </a:p>
-          </p:txBody>
-        </p:sp>
-      </p:grpSp>
       <p:cxnSp>
         <p:nvCxnSpPr>
           <p:cNvPr id="196" name="Straight Arrow Connector 195">
@@ -16463,6 +19195,76 @@
     <p:extLst>
       <p:ext uri="{BB962C8B-B14F-4D97-AF65-F5344CB8AC3E}">
         <p14:creationId xmlns:p14="http://schemas.microsoft.com/office/powerpoint/2010/main" val="136238034"/>
+      </p:ext>
+    </p:extLst>
+  </p:cSld>
+  <p:clrMapOvr>
+    <a:masterClrMapping/>
+  </p:clrMapOvr>
+  <mc:AlternateContent xmlns:mc="http://schemas.openxmlformats.org/markup-compatibility/2006" xmlns:p14="http://schemas.microsoft.com/office/powerpoint/2010/main">
+    <mc:Choice Requires="p14">
+      <p:transition spd="med" p14:dur="700">
+        <p:fade/>
+      </p:transition>
+    </mc:Choice>
+    <mc:Fallback xmlns="">
+      <p:transition spd="med">
+        <p:fade/>
+      </p:transition>
+    </mc:Fallback>
+  </mc:AlternateContent>
+</p:sld>
+</file>
+
+<file path=ppt/slides/slide5.xml><?xml version="1.0" encoding="utf-8"?>
+<p:sld xmlns:a="http://schemas.openxmlformats.org/drawingml/2006/main" xmlns:r="http://schemas.openxmlformats.org/officeDocument/2006/relationships" xmlns:p="http://schemas.openxmlformats.org/presentationml/2006/main">
+  <p:cSld>
+    <p:spTree>
+      <p:nvGrpSpPr>
+        <p:cNvPr id="1" name=""/>
+        <p:cNvGrpSpPr/>
+        <p:nvPr/>
+      </p:nvGrpSpPr>
+      <p:grpSpPr>
+        <a:xfrm>
+          <a:off x="0" y="0"/>
+          <a:ext cx="0" cy="0"/>
+          <a:chOff x="0" y="0"/>
+          <a:chExt cx="0" cy="0"/>
+        </a:xfrm>
+      </p:grpSpPr>
+      <p:graphicFrame>
+        <p:nvGraphicFramePr>
+          <p:cNvPr id="2" name="Diagram 1">
+            <a:extLst>
+              <a:ext uri="{FF2B5EF4-FFF2-40B4-BE49-F238E27FC236}">
+                <a16:creationId xmlns:a16="http://schemas.microsoft.com/office/drawing/2014/main" id="{6CD1BB9C-712B-C16A-9B1B-D46126749E17}"/>
+              </a:ext>
+            </a:extLst>
+          </p:cNvPr>
+          <p:cNvGraphicFramePr/>
+          <p:nvPr>
+            <p:extLst>
+              <p:ext uri="{D42A27DB-BD31-4B8C-83A1-F6EECF244321}">
+                <p14:modId xmlns:p14="http://schemas.microsoft.com/office/powerpoint/2010/main" val="621837522"/>
+              </p:ext>
+            </p:extLst>
+          </p:nvPr>
+        </p:nvGraphicFramePr>
+        <p:xfrm>
+          <a:off x="1730639" y="1319918"/>
+          <a:ext cx="6922559" cy="4615039"/>
+        </p:xfrm>
+        <a:graphic>
+          <a:graphicData uri="http://schemas.openxmlformats.org/drawingml/2006/diagram">
+            <dgm:relIds xmlns:dgm="http://schemas.openxmlformats.org/drawingml/2006/diagram" xmlns:r="http://schemas.openxmlformats.org/officeDocument/2006/relationships" r:dm="rId2" r:lo="rId3" r:qs="rId4" r:cs="rId5"/>
+          </a:graphicData>
+        </a:graphic>
+      </p:graphicFrame>
+    </p:spTree>
+    <p:extLst>
+      <p:ext uri="{BB962C8B-B14F-4D97-AF65-F5344CB8AC3E}">
+        <p14:creationId xmlns:p14="http://schemas.microsoft.com/office/powerpoint/2010/main" val="867142653"/>
       </p:ext>
     </p:extLst>
   </p:cSld>
@@ -17041,15 +19843,6 @@
 </file>
 
 <file path=customXml/item1.xml><?xml version="1.0" encoding="utf-8"?>
-<?mso-contentType ?>
-<FormTemplates xmlns="http://schemas.microsoft.com/sharepoint/v3/contenttype/forms">
-  <Display>DocumentLibraryForm</Display>
-  <Edit>DocumentLibraryForm</Edit>
-  <New>DocumentLibraryForm</New>
-</FormTemplates>
-</file>
-
-<file path=customXml/item2.xml><?xml version="1.0" encoding="utf-8"?>
 <ct:contentTypeSchema xmlns:ct="http://schemas.microsoft.com/office/2006/metadata/contentType" xmlns:ma="http://schemas.microsoft.com/office/2006/metadata/properties/metaAttributes" ct:_="" ma:_="" ma:contentTypeName="Document" ma:contentTypeID="0x010100AAEF04E9A1B48544A813770D804417BF" ma:contentTypeVersion="13" ma:contentTypeDescription="Create a new document." ma:contentTypeScope="" ma:versionID="dd07cf450fc0bbc92bf9b5df4816044e">
   <xsd:schema xmlns:xsd="http://www.w3.org/2001/XMLSchema" xmlns:xs="http://www.w3.org/2001/XMLSchema" xmlns:p="http://schemas.microsoft.com/office/2006/metadata/properties" xmlns:ns1="http://schemas.microsoft.com/sharepoint/v3" xmlns:ns2="9ed5a28f-e285-4793-933e-f86572ea3e88" xmlns:ns3="82D0F40D-97DD-4AB3-B4BB-3ECBE327B628" xmlns:ns4="a130c0bc-081d-4a7d-8c4b-0d956631a56e" xmlns:ns5="82d0f40d-97dd-4ab3-b4bb-3ecbe327b628" targetNamespace="http://schemas.microsoft.com/office/2006/metadata/properties" ma:root="true" ma:fieldsID="7b7da610034bd1dcfa32b40576748e72" ns1:_="" ns2:_="" ns3:_="" ns4:_="" ns5:_="">
     <xsd:import namespace="http://schemas.microsoft.com/sharepoint/v3"/>
@@ -17326,15 +20119,16 @@
 </ct:contentTypeSchema>
 </file>
 
-<file path=customXml/itemProps1.xml><?xml version="1.0" encoding="utf-8"?>
-<ds:datastoreItem xmlns:ds="http://schemas.openxmlformats.org/officeDocument/2006/customXml" ds:itemID="{DC8C7F45-7949-46F2-9260-832792839623}">
-  <ds:schemaRefs>
-    <ds:schemaRef ds:uri="http://schemas.microsoft.com/sharepoint/v3/contenttype/forms"/>
-  </ds:schemaRefs>
-</ds:datastoreItem>
+<file path=customXml/item2.xml><?xml version="1.0" encoding="utf-8"?>
+<?mso-contentType ?>
+<FormTemplates xmlns="http://schemas.microsoft.com/sharepoint/v3/contenttype/forms">
+  <Display>DocumentLibraryForm</Display>
+  <Edit>DocumentLibraryForm</Edit>
+  <New>DocumentLibraryForm</New>
+</FormTemplates>
 </file>
 
-<file path=customXml/itemProps2.xml><?xml version="1.0" encoding="utf-8"?>
+<file path=customXml/itemProps1.xml><?xml version="1.0" encoding="utf-8"?>
 <ds:datastoreItem xmlns:ds="http://schemas.openxmlformats.org/officeDocument/2006/customXml" ds:itemID="{012125AD-686C-426C-A127-14E15AF47F82}">
   <ds:schemaRefs>
     <ds:schemaRef ds:uri="http://schemas.microsoft.com/office/2006/metadata/contentType"/>
@@ -17354,4 +20148,12 @@
     <ds:schemaRef ds:uri="http://schemas.microsoft.com/internal/obd"/>
   </ds:schemaRefs>
 </ds:datastoreItem>
+</file>
+
+<file path=customXml/itemProps2.xml><?xml version="1.0" encoding="utf-8"?>
+<ds:datastoreItem xmlns:ds="http://schemas.openxmlformats.org/officeDocument/2006/customXml" ds:itemID="{DC8C7F45-7949-46F2-9260-832792839623}">
+  <ds:schemaRefs>
+    <ds:schemaRef ds:uri="http://schemas.microsoft.com/sharepoint/v3/contenttype/forms"/>
+  </ds:schemaRefs>
+</ds:datastoreItem>
 </file>
</xml_diff>